<commit_message>
Final commit before the review cycle of 05_Concurrency/01_Basic_Concepts
</commit_message>
<xml_diff>
--- a/lectures/05_Concurrency/01_Basic_Concepts/Slides/01_Basic_Concepts.pptx
+++ b/lectures/05_Concurrency/01_Basic_Concepts/Slides/01_Basic_Concepts.pptx
@@ -233,7 +233,7 @@
           <a:p>
             <a:fld id="{6AEF8CB0-33D2-4F49-9A97-DB788DFC7082}" type="datetimeFigureOut">
               <a:rPr lang="en-GB" smtClean="0"/>
-              <a:t>08/05/2015</a:t>
+              <a:t>01/06/2015</a:t>
             </a:fld>
             <a:endParaRPr lang="en-GB"/>
           </a:p>
@@ -10528,6 +10528,18 @@
           <a:bodyPr/>
           <a:lstStyle/>
           <a:p>
+            <a:r>
+              <a:rPr lang="en-GB" dirty="0" smtClean="0"/>
+              <a:t>Ben </a:t>
+            </a:r>
+            <a:r>
+              <a:rPr lang="en-GB" dirty="0" err="1" smtClean="0"/>
+              <a:t>Brosgol</a:t>
+            </a:r>
+            <a:r>
+              <a:rPr lang="en-GB" dirty="0" smtClean="0"/>
+              <a:t> and Martyn Pike</a:t>
+            </a:r>
             <a:endParaRPr lang="en-GB" dirty="0"/>
           </a:p>
         </p:txBody>
@@ -24387,16 +24399,7 @@
                           </a:solidFill>
                           <a:latin typeface="Courier New" pitchFamily="49" charset="0"/>
                         </a:rPr>
-                        <a:t>   N : Integer := 60</a:t>
-                      </a:r>
-                      <a:r>
-                        <a:rPr lang="en-US" sz="1200" b="0" dirty="0" smtClean="0">
-                          <a:solidFill>
-                            <a:schemeClr val="tx1"/>
-                          </a:solidFill>
-                          <a:latin typeface="Courier New" pitchFamily="49" charset="0"/>
-                        </a:rPr>
-                        <a:t>;</a:t>
+                        <a:t>   N : Integer := 60;</a:t>
                       </a:r>
                     </a:p>
                     <a:p>
@@ -24701,25 +24704,7 @@
                           </a:solidFill>
                           <a:latin typeface="Courier New" pitchFamily="49" charset="0"/>
                         </a:rPr>
-                        <a:t> </a:t>
-                      </a:r>
-                      <a:r>
-                        <a:rPr lang="en-US" sz="1200" b="0" baseline="0" dirty="0" smtClean="0">
-                          <a:solidFill>
-                            <a:schemeClr val="tx1"/>
-                          </a:solidFill>
-                          <a:latin typeface="Courier New" pitchFamily="49" charset="0"/>
-                        </a:rPr>
-                        <a:t>1.0</a:t>
-                      </a:r>
-                      <a:r>
-                        <a:rPr lang="en-US" sz="1200" b="0" baseline="0" dirty="0" smtClean="0">
-                          <a:solidFill>
-                            <a:schemeClr val="tx1"/>
-                          </a:solidFill>
-                          <a:latin typeface="Courier New" pitchFamily="49" charset="0"/>
-                        </a:rPr>
-                        <a:t>;</a:t>
+                        <a:t> 1.0;</a:t>
                       </a:r>
                     </a:p>
                     <a:p>
@@ -24730,25 +24715,7 @@
                           </a:solidFill>
                           <a:latin typeface="Courier New" pitchFamily="49" charset="0"/>
                         </a:rPr>
-                        <a:t>         -- </a:t>
-                      </a:r>
-                      <a:r>
-                        <a:rPr lang="en-US" sz="1200" b="0" i="1" baseline="0" dirty="0" smtClean="0">
-                          <a:solidFill>
-                            <a:schemeClr val="tx1"/>
-                          </a:solidFill>
-                          <a:latin typeface="Courier New" pitchFamily="49" charset="0"/>
-                        </a:rPr>
-                        <a:t>Suspend execution for at least 1 </a:t>
-                      </a:r>
-                      <a:r>
-                        <a:rPr lang="en-US" sz="1200" b="0" i="1" baseline="0" dirty="0" smtClean="0">
-                          <a:solidFill>
-                            <a:schemeClr val="tx1"/>
-                          </a:solidFill>
-                          <a:latin typeface="Courier New" pitchFamily="49" charset="0"/>
-                        </a:rPr>
-                        <a:t>second</a:t>
+                        <a:t>         -- Suspend execution for at least 1 second</a:t>
                       </a:r>
                     </a:p>
                     <a:p>
@@ -24899,16 +24866,7 @@
                           </a:solidFill>
                           <a:latin typeface="Courier New" pitchFamily="49" charset="0"/>
                         </a:rPr>
-                        <a:t>null</a:t>
-                      </a:r>
-                      <a:r>
-                        <a:rPr lang="en-US" sz="1200" b="1" dirty="0" smtClean="0">
-                          <a:solidFill>
-                            <a:schemeClr val="tx1"/>
-                          </a:solidFill>
-                          <a:latin typeface="Courier New" pitchFamily="49" charset="0"/>
-                        </a:rPr>
-                        <a:t>;</a:t>
+                        <a:t>null;</a:t>
                       </a:r>
                     </a:p>
                     <a:p>
@@ -25199,16 +25157,7 @@
                           </a:solidFill>
                           <a:latin typeface="Courier New" pitchFamily="49" charset="0"/>
                         </a:rPr>
-                        <a:t>   N : Integer := 60</a:t>
-                      </a:r>
-                      <a:r>
-                        <a:rPr lang="en-US" sz="1200" b="0" dirty="0" smtClean="0">
-                          <a:solidFill>
-                            <a:schemeClr val="tx1"/>
-                          </a:solidFill>
-                          <a:latin typeface="Courier New" pitchFamily="49" charset="0"/>
-                        </a:rPr>
-                        <a:t>;</a:t>
+                        <a:t>   N : Integer := 60;</a:t>
                       </a:r>
                     </a:p>
                     <a:p>
@@ -25513,25 +25462,7 @@
                           </a:solidFill>
                           <a:latin typeface="Courier New" pitchFamily="49" charset="0"/>
                         </a:rPr>
-                        <a:t> </a:t>
-                      </a:r>
-                      <a:r>
-                        <a:rPr lang="en-US" sz="1200" b="0" baseline="0" dirty="0" smtClean="0">
-                          <a:solidFill>
-                            <a:schemeClr val="tx1"/>
-                          </a:solidFill>
-                          <a:latin typeface="Courier New" pitchFamily="49" charset="0"/>
-                        </a:rPr>
-                        <a:t>1.0</a:t>
-                      </a:r>
-                      <a:r>
-                        <a:rPr lang="en-US" sz="1200" b="0" baseline="0" dirty="0" smtClean="0">
-                          <a:solidFill>
-                            <a:schemeClr val="tx1"/>
-                          </a:solidFill>
-                          <a:latin typeface="Courier New" pitchFamily="49" charset="0"/>
-                        </a:rPr>
-                        <a:t>;</a:t>
+                        <a:t> 1.0;</a:t>
                       </a:r>
                     </a:p>
                     <a:p>
@@ -25542,25 +25473,7 @@
                           </a:solidFill>
                           <a:latin typeface="Courier New" pitchFamily="49" charset="0"/>
                         </a:rPr>
-                        <a:t>         -- </a:t>
-                      </a:r>
-                      <a:r>
-                        <a:rPr lang="en-US" sz="1200" b="0" i="1" baseline="0" dirty="0" smtClean="0">
-                          <a:solidFill>
-                            <a:schemeClr val="tx1"/>
-                          </a:solidFill>
-                          <a:latin typeface="Courier New" pitchFamily="49" charset="0"/>
-                        </a:rPr>
-                        <a:t>Suspend execution for at least 1 </a:t>
-                      </a:r>
-                      <a:r>
-                        <a:rPr lang="en-US" sz="1200" b="0" i="1" baseline="0" dirty="0" smtClean="0">
-                          <a:solidFill>
-                            <a:schemeClr val="tx1"/>
-                          </a:solidFill>
-                          <a:latin typeface="Courier New" pitchFamily="49" charset="0"/>
-                        </a:rPr>
-                        <a:t>second</a:t>
+                        <a:t>         -- Suspend execution for at least 1 second</a:t>
                       </a:r>
                     </a:p>
                     <a:p>
@@ -25711,16 +25624,7 @@
                           </a:solidFill>
                           <a:latin typeface="Courier New" pitchFamily="49" charset="0"/>
                         </a:rPr>
-                        <a:t>null</a:t>
-                      </a:r>
-                      <a:r>
-                        <a:rPr lang="en-US" sz="1200" b="1" dirty="0" smtClean="0">
-                          <a:solidFill>
-                            <a:schemeClr val="tx1"/>
-                          </a:solidFill>
-                          <a:latin typeface="Courier New" pitchFamily="49" charset="0"/>
-                        </a:rPr>
-                        <a:t>;</a:t>
+                        <a:t>null;</a:t>
                       </a:r>
                     </a:p>
                     <a:p>
@@ -26173,12 +26077,6 @@
                         </a:rPr>
                         <a:t> 1.0;</a:t>
                       </a:r>
-                      <a:endParaRPr lang="en-US" sz="1200" b="0" i="0" dirty="0" smtClean="0">
-                        <a:solidFill>
-                          <a:schemeClr val="tx1"/>
-                        </a:solidFill>
-                        <a:latin typeface="Courier New" pitchFamily="49" charset="0"/>
-                      </a:endParaRPr>
                     </a:p>
                   </a:txBody>
                   <a:tcPr marL="91421" marR="91421" marT="45583" marB="45583">

</xml_diff>

<commit_message>
Commit final version of 05_Concurrency/01_Basic_Concepts
</commit_message>
<xml_diff>
--- a/lectures/05_Concurrency/01_Basic_Concepts/Slides/01_Basic_Concepts.pptx
+++ b/lectures/05_Concurrency/01_Basic_Concepts/Slides/01_Basic_Concepts.pptx
@@ -41,8 +41,8 @@
     <p:sldId id="288" r:id="rId32"/>
     <p:sldId id="289" r:id="rId33"/>
     <p:sldId id="290" r:id="rId34"/>
-    <p:sldId id="291" r:id="rId35"/>
-    <p:sldId id="292" r:id="rId36"/>
+    <p:sldId id="293" r:id="rId35"/>
+    <p:sldId id="294" r:id="rId36"/>
     <p:sldId id="257" r:id="rId37"/>
     <p:sldId id="260" r:id="rId38"/>
   </p:sldIdLst>
@@ -233,7 +233,7 @@
           <a:p>
             <a:fld id="{6AEF8CB0-33D2-4F49-9A97-DB788DFC7082}" type="datetimeFigureOut">
               <a:rPr lang="en-GB" smtClean="0"/>
-              <a:t>01/06/2015</a:t>
+              <a:t>15/06/2015</a:t>
             </a:fld>
             <a:endParaRPr lang="en-GB"/>
           </a:p>
@@ -26665,7 +26665,7 @@
       </p:grpSpPr>
       <p:sp>
         <p:nvSpPr>
-          <p:cNvPr id="2" name="Title 1"/>
+          <p:cNvPr id="3" name="Title 2"/>
           <p:cNvSpPr>
             <a:spLocks noGrp="1"/>
           </p:cNvSpPr>
@@ -26680,7 +26680,7 @@
           <a:p>
             <a:r>
               <a:rPr lang="en-GB" dirty="0" smtClean="0"/>
-              <a:t>Is this code thread safe ? (10/10)</a:t>
+              <a:t>(10/10)</a:t>
             </a:r>
             <a:endParaRPr lang="en-GB" dirty="0"/>
           </a:p>
@@ -26688,21 +26688,21 @@
       </p:sp>
       <p:graphicFrame>
         <p:nvGraphicFramePr>
-          <p:cNvPr id="3" name="Tableau 5"/>
+          <p:cNvPr id="4" name="Tableau 5"/>
           <p:cNvGraphicFramePr>
             <a:graphicFrameLocks noGrp="1"/>
           </p:cNvGraphicFramePr>
           <p:nvPr>
             <p:extLst>
               <p:ext uri="{D42A27DB-BD31-4B8C-83A1-F6EECF244321}">
-                <p14:modId xmlns:p14="http://schemas.microsoft.com/office/powerpoint/2010/main" val="3830498224"/>
+                <p14:modId xmlns:p14="http://schemas.microsoft.com/office/powerpoint/2010/main" val="4146309079"/>
               </p:ext>
             </p:extLst>
           </p:nvPr>
         </p:nvGraphicFramePr>
         <p:xfrm>
-          <a:off x="1206668" y="894224"/>
-          <a:ext cx="6950361" cy="5577566"/>
+          <a:off x="2237606" y="1790837"/>
+          <a:ext cx="4668788" cy="3276326"/>
         </p:xfrm>
         <a:graphic>
           <a:graphicData uri="http://schemas.openxmlformats.org/drawingml/2006/table">
@@ -26711,34 +26711,25 @@
                 <a:tableStyleId>{5C22544A-7EE6-4342-B048-85BDC9FD1C3A}</a:tableStyleId>
               </a:tblPr>
               <a:tblGrid>
-                <a:gridCol w="6950361"/>
+                <a:gridCol w="4668788"/>
               </a:tblGrid>
-              <a:tr h="4415627">
+              <a:tr h="2913239">
                 <a:tc>
                   <a:txBody>
                     <a:bodyPr/>
                     <a:lstStyle/>
                     <a:p>
                       <a:r>
-                        <a:rPr lang="en-US" sz="1200" b="1" dirty="0" smtClean="0">
-                          <a:solidFill>
-                            <a:schemeClr val="tx1"/>
-                          </a:solidFill>
-                          <a:latin typeface="Courier New" pitchFamily="49" charset="0"/>
-                        </a:rPr>
-                        <a:t>with</a:t>
-                      </a:r>
-                      <a:r>
-                        <a:rPr lang="en-US" sz="1200" b="0" dirty="0" smtClean="0">
-                          <a:solidFill>
-                            <a:schemeClr val="tx1"/>
-                          </a:solidFill>
-                          <a:latin typeface="Courier New" pitchFamily="49" charset="0"/>
-                        </a:rPr>
-                        <a:t> </a:t>
-                      </a:r>
-                      <a:r>
-                        <a:rPr lang="en-US" sz="1200" b="0" dirty="0" err="1" smtClean="0">
+                        <a:rPr lang="en-US" sz="1100" b="1" dirty="0" smtClean="0">
+                          <a:solidFill>
+                            <a:schemeClr val="tx1"/>
+                          </a:solidFill>
+                          <a:latin typeface="Courier New" pitchFamily="49" charset="0"/>
+                        </a:rPr>
+                        <a:t>with </a:t>
+                      </a:r>
+                      <a:r>
+                        <a:rPr lang="en-US" sz="1100" b="0" dirty="0" err="1" smtClean="0">
                           <a:solidFill>
                             <a:schemeClr val="tx1"/>
                           </a:solidFill>
@@ -26747,43 +26738,7 @@
                         <a:t>Ada.Text_IO</a:t>
                       </a:r>
                       <a:r>
-                        <a:rPr lang="en-US" sz="1200" b="0" dirty="0" smtClean="0">
-                          <a:solidFill>
-                            <a:schemeClr val="tx1"/>
-                          </a:solidFill>
-                          <a:latin typeface="Courier New" pitchFamily="49" charset="0"/>
-                        </a:rPr>
-                        <a:t>; </a:t>
-                      </a:r>
-                      <a:r>
-                        <a:rPr lang="en-US" sz="1200" b="1" dirty="0" smtClean="0">
-                          <a:solidFill>
-                            <a:schemeClr val="tx1"/>
-                          </a:solidFill>
-                          <a:latin typeface="Courier New" pitchFamily="49" charset="0"/>
-                        </a:rPr>
-                        <a:t>use</a:t>
-                      </a:r>
-                      <a:r>
-                        <a:rPr lang="en-US" sz="1200" b="0" dirty="0" smtClean="0">
-                          <a:solidFill>
-                            <a:schemeClr val="tx1"/>
-                          </a:solidFill>
-                          <a:latin typeface="Courier New" pitchFamily="49" charset="0"/>
-                        </a:rPr>
-                        <a:t> </a:t>
-                      </a:r>
-                      <a:r>
-                        <a:rPr lang="en-US" sz="1200" b="0" dirty="0" err="1" smtClean="0">
-                          <a:solidFill>
-                            <a:schemeClr val="tx1"/>
-                          </a:solidFill>
-                          <a:latin typeface="Courier New" pitchFamily="49" charset="0"/>
-                        </a:rPr>
-                        <a:t>Ada.Text_IO</a:t>
-                      </a:r>
-                      <a:r>
-                        <a:rPr lang="en-US" sz="1200" b="0" dirty="0" smtClean="0">
+                        <a:rPr lang="en-US" sz="1100" b="0" dirty="0" smtClean="0">
                           <a:solidFill>
                             <a:schemeClr val="tx1"/>
                           </a:solidFill>
@@ -26791,9 +26746,7 @@
                         </a:rPr>
                         <a:t>;</a:t>
                       </a:r>
-                    </a:p>
-                    <a:p>
-                      <a:endParaRPr lang="en-US" sz="1200" b="0" dirty="0" smtClean="0">
+                      <a:endParaRPr lang="en-US" sz="1100" b="1" dirty="0" smtClean="0">
                         <a:solidFill>
                           <a:schemeClr val="tx1"/>
                         </a:solidFill>
@@ -26801,172 +26754,7 @@
                       </a:endParaRPr>
                     </a:p>
                     <a:p>
-                      <a:r>
-                        <a:rPr lang="en-US" sz="1200" b="1" dirty="0" smtClean="0">
-                          <a:solidFill>
-                            <a:schemeClr val="tx1"/>
-                          </a:solidFill>
-                          <a:latin typeface="Courier New" pitchFamily="49" charset="0"/>
-                        </a:rPr>
-                        <a:t>procedure</a:t>
-                      </a:r>
-                      <a:r>
-                        <a:rPr lang="en-US" sz="1200" b="0" dirty="0" smtClean="0">
-                          <a:solidFill>
-                            <a:schemeClr val="tx1"/>
-                          </a:solidFill>
-                          <a:latin typeface="Courier New" pitchFamily="49" charset="0"/>
-                        </a:rPr>
-                        <a:t> Main </a:t>
-                      </a:r>
-                      <a:r>
-                        <a:rPr lang="en-US" sz="1200" b="1" dirty="0" smtClean="0">
-                          <a:solidFill>
-                            <a:schemeClr val="tx1"/>
-                          </a:solidFill>
-                          <a:latin typeface="Courier New" pitchFamily="49" charset="0"/>
-                        </a:rPr>
-                        <a:t>is</a:t>
-                      </a:r>
-                    </a:p>
-                    <a:p>
-                      <a:r>
-                        <a:rPr lang="en-US" sz="1200" b="0" dirty="0" smtClean="0">
-                          <a:solidFill>
-                            <a:schemeClr val="tx1"/>
-                          </a:solidFill>
-                          <a:latin typeface="Courier New" pitchFamily="49" charset="0"/>
-                        </a:rPr>
-                        <a:t>   Variable : </a:t>
-                      </a:r>
-                      <a:r>
-                        <a:rPr lang="en-US" sz="1200" b="1" dirty="0" smtClean="0">
-                          <a:solidFill>
-                            <a:schemeClr val="tx1"/>
-                          </a:solidFill>
-                          <a:latin typeface="Courier New" pitchFamily="49" charset="0"/>
-                        </a:rPr>
-                        <a:t>Boolean</a:t>
-                      </a:r>
-                      <a:r>
-                        <a:rPr lang="en-US" sz="1200" b="0" dirty="0" smtClean="0">
-                          <a:solidFill>
-                            <a:schemeClr val="tx1"/>
-                          </a:solidFill>
-                          <a:latin typeface="Courier New" pitchFamily="49" charset="0"/>
-                        </a:rPr>
-                        <a:t> := True;        </a:t>
-                      </a:r>
-                    </a:p>
-                    <a:p>
-                      <a:r>
-                        <a:rPr lang="en-US" sz="1200" b="1" dirty="0" smtClean="0">
-                          <a:solidFill>
-                            <a:schemeClr val="tx1"/>
-                          </a:solidFill>
-                          <a:latin typeface="Courier New" pitchFamily="49" charset="0"/>
-                        </a:rPr>
-                        <a:t>begin</a:t>
-                      </a:r>
-                    </a:p>
-                    <a:p>
-                      <a:r>
-                        <a:rPr lang="en-US" sz="1200" b="0" dirty="0" smtClean="0">
-                          <a:solidFill>
-                            <a:schemeClr val="tx1"/>
-                          </a:solidFill>
-                          <a:latin typeface="Courier New" pitchFamily="49" charset="0"/>
-                        </a:rPr>
-                        <a:t>   </a:t>
-                      </a:r>
-                      <a:r>
-                        <a:rPr lang="en-US" sz="1200" b="0" dirty="0" err="1" smtClean="0">
-                          <a:solidFill>
-                            <a:schemeClr val="tx1"/>
-                          </a:solidFill>
-                          <a:latin typeface="Courier New" pitchFamily="49" charset="0"/>
-                        </a:rPr>
-                        <a:t>Two_Tasks</a:t>
-                      </a:r>
-                      <a:r>
-                        <a:rPr lang="en-US" sz="1200" b="0" dirty="0" smtClean="0">
-                          <a:solidFill>
-                            <a:schemeClr val="tx1"/>
-                          </a:solidFill>
-                          <a:latin typeface="Courier New" pitchFamily="49" charset="0"/>
-                        </a:rPr>
-                        <a:t>:</a:t>
-                      </a:r>
-                    </a:p>
-                    <a:p>
-                      <a:r>
-                        <a:rPr lang="en-US" sz="1200" b="0" dirty="0" smtClean="0">
-                          <a:solidFill>
-                            <a:schemeClr val="tx1"/>
-                          </a:solidFill>
-                          <a:latin typeface="Courier New" pitchFamily="49" charset="0"/>
-                        </a:rPr>
-                        <a:t>   </a:t>
-                      </a:r>
-                      <a:r>
-                        <a:rPr lang="en-US" sz="1200" b="1" dirty="0" smtClean="0">
-                          <a:solidFill>
-                            <a:schemeClr val="tx1"/>
-                          </a:solidFill>
-                          <a:latin typeface="Courier New" pitchFamily="49" charset="0"/>
-                        </a:rPr>
-                        <a:t>declare</a:t>
-                      </a:r>
-                    </a:p>
-                    <a:p>
-                      <a:r>
-                        <a:rPr lang="en-US" sz="1200" b="0" dirty="0" smtClean="0">
-                          <a:solidFill>
-                            <a:schemeClr val="tx1"/>
-                          </a:solidFill>
-                          <a:latin typeface="Courier New" pitchFamily="49" charset="0"/>
-                        </a:rPr>
-                        <a:t>      </a:t>
-                      </a:r>
-                      <a:r>
-                        <a:rPr lang="en-US" sz="1200" b="1" dirty="0" smtClean="0">
-                          <a:solidFill>
-                            <a:schemeClr val="tx1"/>
-                          </a:solidFill>
-                          <a:latin typeface="Courier New" pitchFamily="49" charset="0"/>
-                        </a:rPr>
-                        <a:t>task</a:t>
-                      </a:r>
-                      <a:r>
-                        <a:rPr lang="en-US" sz="1200" b="0" dirty="0" smtClean="0">
-                          <a:solidFill>
-                            <a:schemeClr val="tx1"/>
-                          </a:solidFill>
-                          <a:latin typeface="Courier New" pitchFamily="49" charset="0"/>
-                        </a:rPr>
-                        <a:t> Task1; </a:t>
-                      </a:r>
-                      <a:r>
-                        <a:rPr lang="en-US" sz="1200" b="1" dirty="0" smtClean="0">
-                          <a:solidFill>
-                            <a:schemeClr val="tx1"/>
-                          </a:solidFill>
-                          <a:latin typeface="Courier New" pitchFamily="49" charset="0"/>
-                        </a:rPr>
-                        <a:t>task</a:t>
-                      </a:r>
-                      <a:r>
-                        <a:rPr lang="en-US" sz="1200" b="0" dirty="0" smtClean="0">
-                          <a:solidFill>
-                            <a:schemeClr val="tx1"/>
-                          </a:solidFill>
-                          <a:latin typeface="Courier New" pitchFamily="49" charset="0"/>
-                        </a:rPr>
-                        <a:t> Task2;</a:t>
-                      </a:r>
-                    </a:p>
-                    <a:p>
-                      <a:endParaRPr lang="en-US" sz="1200" b="0" dirty="0" smtClean="0">
+                      <a:endParaRPr lang="en-US" sz="1100" b="1" dirty="0" smtClean="0">
                         <a:solidFill>
                           <a:schemeClr val="tx1"/>
                         </a:solidFill>
@@ -26975,7 +26763,258 @@
                     </a:p>
                     <a:p>
                       <a:r>
-                        <a:rPr lang="en-US" sz="1200" b="0" dirty="0" smtClean="0">
+                        <a:rPr lang="en-US" sz="1100" b="1" dirty="0" smtClean="0">
+                          <a:solidFill>
+                            <a:schemeClr val="tx1"/>
+                          </a:solidFill>
+                          <a:latin typeface="Courier New" pitchFamily="49" charset="0"/>
+                        </a:rPr>
+                        <a:t>procedure</a:t>
+                      </a:r>
+                      <a:r>
+                        <a:rPr lang="en-US" sz="1100" b="0" dirty="0" smtClean="0">
+                          <a:solidFill>
+                            <a:schemeClr val="tx1"/>
+                          </a:solidFill>
+                          <a:latin typeface="Courier New" pitchFamily="49" charset="0"/>
+                        </a:rPr>
+                        <a:t> </a:t>
+                      </a:r>
+                      <a:r>
+                        <a:rPr lang="en-US" sz="1100" b="0" dirty="0" err="1" smtClean="0">
+                          <a:solidFill>
+                            <a:schemeClr val="tx1"/>
+                          </a:solidFill>
+                          <a:latin typeface="Courier New" pitchFamily="49" charset="0"/>
+                        </a:rPr>
+                        <a:t>Simple_Tasking_Program</a:t>
+                      </a:r>
+                      <a:r>
+                        <a:rPr lang="en-US" sz="1100" b="0" dirty="0" smtClean="0">
+                          <a:solidFill>
+                            <a:schemeClr val="tx1"/>
+                          </a:solidFill>
+                          <a:latin typeface="Courier New" pitchFamily="49" charset="0"/>
+                        </a:rPr>
+                        <a:t> </a:t>
+                      </a:r>
+                      <a:r>
+                        <a:rPr lang="en-US" sz="1100" b="1" dirty="0" smtClean="0">
+                          <a:solidFill>
+                            <a:schemeClr val="tx1"/>
+                          </a:solidFill>
+                          <a:latin typeface="Courier New" pitchFamily="49" charset="0"/>
+                        </a:rPr>
+                        <a:t>is</a:t>
+                      </a:r>
+                    </a:p>
+                    <a:p>
+                      <a:endParaRPr lang="en-US" sz="1100" b="0" dirty="0" smtClean="0">
+                        <a:solidFill>
+                          <a:schemeClr val="tx1"/>
+                        </a:solidFill>
+                        <a:latin typeface="Courier New" pitchFamily="49" charset="0"/>
+                      </a:endParaRPr>
+                    </a:p>
+                    <a:p>
+                      <a:r>
+                        <a:rPr lang="en-US" sz="1100" b="0" dirty="0" smtClean="0">
+                          <a:solidFill>
+                            <a:schemeClr val="tx1"/>
+                          </a:solidFill>
+                          <a:latin typeface="Courier New" pitchFamily="49" charset="0"/>
+                        </a:rPr>
+                        <a:t>   </a:t>
+                      </a:r>
+                      <a:r>
+                        <a:rPr lang="en-US" sz="1100" b="0" dirty="0" smtClean="0">
+                          <a:solidFill>
+                            <a:schemeClr val="tx1"/>
+                          </a:solidFill>
+                          <a:latin typeface="Courier New" pitchFamily="49" charset="0"/>
+                        </a:rPr>
+                        <a:t>N : Integer := 60</a:t>
+                      </a:r>
+                      <a:r>
+                        <a:rPr lang="en-US" sz="1100" b="0" dirty="0" smtClean="0">
+                          <a:solidFill>
+                            <a:schemeClr val="tx1"/>
+                          </a:solidFill>
+                          <a:latin typeface="Courier New" pitchFamily="49" charset="0"/>
+                        </a:rPr>
+                        <a:t>;</a:t>
+                      </a:r>
+                    </a:p>
+                    <a:p>
+                      <a:endParaRPr lang="en-US" sz="1100" b="0" dirty="0" smtClean="0">
+                        <a:solidFill>
+                          <a:schemeClr val="tx1"/>
+                        </a:solidFill>
+                        <a:latin typeface="Courier New" pitchFamily="49" charset="0"/>
+                      </a:endParaRPr>
+                    </a:p>
+                    <a:p>
+                      <a:r>
+                        <a:rPr lang="en-US" sz="1100" b="0" dirty="0" smtClean="0">
+                          <a:solidFill>
+                            <a:schemeClr val="tx1"/>
+                          </a:solidFill>
+                          <a:latin typeface="Courier New" pitchFamily="49" charset="0"/>
+                        </a:rPr>
+                        <a:t>   </a:t>
+                      </a:r>
+                      <a:r>
+                        <a:rPr lang="en-US" sz="1100" b="1" dirty="0" smtClean="0">
+                          <a:solidFill>
+                            <a:schemeClr val="tx1"/>
+                          </a:solidFill>
+                          <a:latin typeface="Courier New" pitchFamily="49" charset="0"/>
+                        </a:rPr>
+                        <a:t>task</a:t>
+                      </a:r>
+                      <a:r>
+                        <a:rPr lang="en-US" sz="1100" b="0" dirty="0" smtClean="0">
+                          <a:solidFill>
+                            <a:schemeClr val="tx1"/>
+                          </a:solidFill>
+                          <a:latin typeface="Courier New" pitchFamily="49" charset="0"/>
+                        </a:rPr>
+                        <a:t> </a:t>
+                      </a:r>
+                      <a:r>
+                        <a:rPr lang="en-US" sz="1100" b="0" dirty="0" err="1" smtClean="0">
+                          <a:solidFill>
+                            <a:schemeClr val="tx1"/>
+                          </a:solidFill>
+                          <a:latin typeface="Courier New" pitchFamily="49" charset="0"/>
+                        </a:rPr>
+                        <a:t>Simple_Task</a:t>
+                      </a:r>
+                      <a:r>
+                        <a:rPr lang="en-US" sz="1100" b="0" dirty="0" smtClean="0">
+                          <a:solidFill>
+                            <a:schemeClr val="tx1"/>
+                          </a:solidFill>
+                          <a:latin typeface="Courier New" pitchFamily="49" charset="0"/>
+                        </a:rPr>
+                        <a:t>;</a:t>
+                      </a:r>
+                    </a:p>
+                    <a:p>
+                      <a:endParaRPr lang="en-US" sz="1100" b="0" dirty="0" smtClean="0">
+                        <a:solidFill>
+                          <a:schemeClr val="tx1"/>
+                        </a:solidFill>
+                        <a:latin typeface="Courier New" pitchFamily="49" charset="0"/>
+                      </a:endParaRPr>
+                    </a:p>
+                    <a:p>
+                      <a:r>
+                        <a:rPr lang="en-US" sz="1100" b="1" dirty="0" smtClean="0">
+                          <a:solidFill>
+                            <a:schemeClr val="tx1"/>
+                          </a:solidFill>
+                          <a:latin typeface="Courier New" pitchFamily="49" charset="0"/>
+                        </a:rPr>
+                        <a:t>begin</a:t>
+                      </a:r>
+                    </a:p>
+                    <a:p>
+                      <a:endParaRPr lang="en-US" sz="1100" b="0" dirty="0" smtClean="0">
+                        <a:solidFill>
+                          <a:schemeClr val="tx1"/>
+                        </a:solidFill>
+                        <a:latin typeface="Courier New" pitchFamily="49" charset="0"/>
+                      </a:endParaRPr>
+                    </a:p>
+                    <a:p>
+                      <a:r>
+                        <a:rPr lang="en-US" sz="1100" b="0" dirty="0" smtClean="0">
+                          <a:solidFill>
+                            <a:schemeClr val="tx1"/>
+                          </a:solidFill>
+                          <a:latin typeface="Courier New" pitchFamily="49" charset="0"/>
+                        </a:rPr>
+                        <a:t>   </a:t>
+                      </a:r>
+                      <a:r>
+                        <a:rPr lang="en-US" sz="1100" b="1" dirty="0" smtClean="0">
+                          <a:solidFill>
+                            <a:schemeClr val="tx1"/>
+                          </a:solidFill>
+                          <a:latin typeface="Courier New" pitchFamily="49" charset="0"/>
+                        </a:rPr>
+                        <a:t>task</a:t>
+                      </a:r>
+                      <a:r>
+                        <a:rPr lang="en-US" sz="1100" b="1" baseline="0" dirty="0" smtClean="0">
+                          <a:solidFill>
+                            <a:schemeClr val="tx1"/>
+                          </a:solidFill>
+                          <a:latin typeface="Courier New" pitchFamily="49" charset="0"/>
+                        </a:rPr>
+                        <a:t> body</a:t>
+                      </a:r>
+                      <a:r>
+                        <a:rPr lang="en-US" sz="1100" b="0" baseline="0" dirty="0" smtClean="0">
+                          <a:solidFill>
+                            <a:schemeClr val="tx1"/>
+                          </a:solidFill>
+                          <a:latin typeface="Courier New" pitchFamily="49" charset="0"/>
+                        </a:rPr>
+                        <a:t> </a:t>
+                      </a:r>
+                      <a:r>
+                        <a:rPr lang="en-US" sz="1100" b="0" baseline="0" dirty="0" err="1" smtClean="0">
+                          <a:solidFill>
+                            <a:schemeClr val="tx1"/>
+                          </a:solidFill>
+                          <a:latin typeface="Courier New" pitchFamily="49" charset="0"/>
+                        </a:rPr>
+                        <a:t>Simple_Task</a:t>
+                      </a:r>
+                      <a:r>
+                        <a:rPr lang="en-US" sz="1100" b="0" baseline="0" dirty="0" smtClean="0">
+                          <a:solidFill>
+                            <a:schemeClr val="tx1"/>
+                          </a:solidFill>
+                          <a:latin typeface="Courier New" pitchFamily="49" charset="0"/>
+                        </a:rPr>
+                        <a:t> </a:t>
+                      </a:r>
+                      <a:r>
+                        <a:rPr lang="en-US" sz="1100" b="1" baseline="0" dirty="0" smtClean="0">
+                          <a:solidFill>
+                            <a:schemeClr val="tx1"/>
+                          </a:solidFill>
+                          <a:latin typeface="Courier New" pitchFamily="49" charset="0"/>
+                        </a:rPr>
+                        <a:t>is</a:t>
+                      </a:r>
+                    </a:p>
+                    <a:p>
+                      <a:r>
+                        <a:rPr lang="en-US" sz="1100" b="0" baseline="0" dirty="0" smtClean="0">
+                          <a:solidFill>
+                            <a:schemeClr val="tx1"/>
+                          </a:solidFill>
+                          <a:latin typeface="Courier New" pitchFamily="49" charset="0"/>
+                        </a:rPr>
+                        <a:t>   </a:t>
+                      </a:r>
+                      <a:r>
+                        <a:rPr lang="en-US" sz="1100" b="1" baseline="0" dirty="0" smtClean="0">
+                          <a:solidFill>
+                            <a:schemeClr val="tx1"/>
+                          </a:solidFill>
+                          <a:latin typeface="Courier New" pitchFamily="49" charset="0"/>
+                        </a:rPr>
+                        <a:t>begin</a:t>
+                      </a:r>
+                    </a:p>
+                    <a:p>
+                      <a:r>
+                        <a:rPr lang="en-US" sz="1100" b="0" baseline="0" dirty="0" smtClean="0">
                           <a:solidFill>
                             <a:schemeClr val="tx1"/>
                           </a:solidFill>
@@ -26984,16 +27023,177 @@
                         <a:t>      </a:t>
                       </a:r>
                       <a:r>
-                        <a:rPr lang="en-US" sz="1200" b="1" dirty="0" smtClean="0">
-                          <a:solidFill>
-                            <a:schemeClr val="tx1"/>
-                          </a:solidFill>
-                          <a:latin typeface="Courier New" pitchFamily="49" charset="0"/>
-                        </a:rPr>
-                        <a:t>task</a:t>
-                      </a:r>
-                      <a:r>
-                        <a:rPr lang="en-US" sz="1200" b="0" dirty="0" smtClean="0">
+                        <a:rPr lang="en-US" sz="1100" b="1" baseline="0" dirty="0" smtClean="0">
+                          <a:solidFill>
+                            <a:schemeClr val="tx1"/>
+                          </a:solidFill>
+                          <a:latin typeface="Courier New" pitchFamily="49" charset="0"/>
+                        </a:rPr>
+                        <a:t>for</a:t>
+                      </a:r>
+                      <a:r>
+                        <a:rPr lang="en-US" sz="1100" b="0" baseline="0" dirty="0" smtClean="0">
+                          <a:solidFill>
+                            <a:schemeClr val="tx1"/>
+                          </a:solidFill>
+                          <a:latin typeface="Courier New" pitchFamily="49" charset="0"/>
+                        </a:rPr>
+                        <a:t> I </a:t>
+                      </a:r>
+                      <a:r>
+                        <a:rPr lang="en-US" sz="1100" b="1" baseline="0" dirty="0" smtClean="0">
+                          <a:solidFill>
+                            <a:schemeClr val="tx1"/>
+                          </a:solidFill>
+                          <a:latin typeface="Courier New" pitchFamily="49" charset="0"/>
+                        </a:rPr>
+                        <a:t>in</a:t>
+                      </a:r>
+                      <a:r>
+                        <a:rPr lang="en-US" sz="1100" b="0" baseline="0" dirty="0" smtClean="0">
+                          <a:solidFill>
+                            <a:schemeClr val="tx1"/>
+                          </a:solidFill>
+                          <a:latin typeface="Courier New" pitchFamily="49" charset="0"/>
+                        </a:rPr>
+                        <a:t> 1..N </a:t>
+                      </a:r>
+                      <a:r>
+                        <a:rPr lang="en-US" sz="1100" b="1" baseline="0" dirty="0" smtClean="0">
+                          <a:solidFill>
+                            <a:schemeClr val="tx1"/>
+                          </a:solidFill>
+                          <a:latin typeface="Courier New" pitchFamily="49" charset="0"/>
+                        </a:rPr>
+                        <a:t>loop</a:t>
+                      </a:r>
+                    </a:p>
+                    <a:p>
+                      <a:r>
+                        <a:rPr lang="en-US" sz="1100" b="0" baseline="0" dirty="0" smtClean="0">
+                          <a:solidFill>
+                            <a:schemeClr val="tx1"/>
+                          </a:solidFill>
+                          <a:latin typeface="Courier New" pitchFamily="49" charset="0"/>
+                        </a:rPr>
+                        <a:t>         </a:t>
+                      </a:r>
+                      <a:r>
+                        <a:rPr lang="en-US" sz="1100" b="0" baseline="0" dirty="0" err="1" smtClean="0">
+                          <a:solidFill>
+                            <a:schemeClr val="tx1"/>
+                          </a:solidFill>
+                          <a:latin typeface="Courier New" pitchFamily="49" charset="0"/>
+                        </a:rPr>
+                        <a:t>Ada.Text_IO.Put_Line</a:t>
+                      </a:r>
+                      <a:r>
+                        <a:rPr lang="en-US" sz="1100" b="0" baseline="0" dirty="0" smtClean="0">
+                          <a:solidFill>
+                            <a:schemeClr val="tx1"/>
+                          </a:solidFill>
+                          <a:latin typeface="Courier New" pitchFamily="49" charset="0"/>
+                        </a:rPr>
+                        <a:t> ("Hello");</a:t>
+                      </a:r>
+                    </a:p>
+                    <a:p>
+                      <a:r>
+                        <a:rPr lang="en-US" sz="1100" b="0" baseline="0" dirty="0" smtClean="0">
+                          <a:solidFill>
+                            <a:schemeClr val="tx1"/>
+                          </a:solidFill>
+                          <a:latin typeface="Courier New" pitchFamily="49" charset="0"/>
+                        </a:rPr>
+                        <a:t>         </a:t>
+                      </a:r>
+                      <a:r>
+                        <a:rPr lang="en-US" sz="1100" b="1" baseline="0" dirty="0" smtClean="0">
+                          <a:solidFill>
+                            <a:schemeClr val="tx1"/>
+                          </a:solidFill>
+                          <a:latin typeface="Courier New" pitchFamily="49" charset="0"/>
+                        </a:rPr>
+                        <a:t>delay</a:t>
+                      </a:r>
+                      <a:r>
+                        <a:rPr lang="en-US" sz="1100" b="0" baseline="0" dirty="0" smtClean="0">
+                          <a:solidFill>
+                            <a:schemeClr val="tx1"/>
+                          </a:solidFill>
+                          <a:latin typeface="Courier New" pitchFamily="49" charset="0"/>
+                        </a:rPr>
+                        <a:t> 1.0</a:t>
+                      </a:r>
+                      <a:r>
+                        <a:rPr lang="en-US" sz="1100" b="0" baseline="0" dirty="0" smtClean="0">
+                          <a:solidFill>
+                            <a:schemeClr val="tx1"/>
+                          </a:solidFill>
+                          <a:latin typeface="Courier New" pitchFamily="49" charset="0"/>
+                        </a:rPr>
+                        <a:t>;</a:t>
+                      </a:r>
+                    </a:p>
+                    <a:p>
+                      <a:r>
+                        <a:rPr lang="en-US" sz="1100" b="0" baseline="0" dirty="0" smtClean="0">
+                          <a:solidFill>
+                            <a:schemeClr val="tx1"/>
+                          </a:solidFill>
+                          <a:latin typeface="Courier New" pitchFamily="49" charset="0"/>
+                        </a:rPr>
+                        <a:t>      </a:t>
+                      </a:r>
+                      <a:r>
+                        <a:rPr lang="en-US" sz="1100" b="1" baseline="0" dirty="0" smtClean="0">
+                          <a:solidFill>
+                            <a:schemeClr val="tx1"/>
+                          </a:solidFill>
+                          <a:latin typeface="Courier New" pitchFamily="49" charset="0"/>
+                        </a:rPr>
+                        <a:t>end </a:t>
+                      </a:r>
+                      <a:r>
+                        <a:rPr lang="en-US" sz="1100" b="1" baseline="0" dirty="0" smtClean="0">
+                          <a:solidFill>
+                            <a:schemeClr val="tx1"/>
+                          </a:solidFill>
+                          <a:latin typeface="Courier New" pitchFamily="49" charset="0"/>
+                        </a:rPr>
+                        <a:t>loop</a:t>
+                      </a:r>
+                      <a:r>
+                        <a:rPr lang="en-US" sz="1100" b="0" baseline="0" dirty="0" smtClean="0">
+                          <a:solidFill>
+                            <a:schemeClr val="tx1"/>
+                          </a:solidFill>
+                          <a:latin typeface="Courier New" pitchFamily="49" charset="0"/>
+                        </a:rPr>
+                        <a:t>;</a:t>
+                      </a:r>
+                    </a:p>
+                    <a:p>
+                      <a:r>
+                        <a:rPr lang="en-US" sz="1100" b="0" baseline="0" dirty="0" smtClean="0">
+                          <a:solidFill>
+                            <a:schemeClr val="tx1"/>
+                          </a:solidFill>
+                          <a:latin typeface="Courier New" pitchFamily="49" charset="0"/>
+                        </a:rPr>
+                        <a:t>   </a:t>
+                      </a:r>
+                      <a:r>
+                        <a:rPr lang="en-US" sz="1100" b="1" baseline="0" dirty="0" smtClean="0">
+                          <a:solidFill>
+                            <a:schemeClr val="tx1"/>
+                          </a:solidFill>
+                          <a:latin typeface="Courier New" pitchFamily="49" charset="0"/>
+                        </a:rPr>
+                        <a:t>end</a:t>
+                      </a:r>
+                      <a:r>
+                        <a:rPr lang="en-US" sz="1100" b="0" baseline="0" dirty="0" smtClean="0">
                           <a:solidFill>
                             <a:schemeClr val="tx1"/>
                           </a:solidFill>
@@ -27002,268 +27202,50 @@
                         <a:t> </a:t>
                       </a:r>
                       <a:r>
-                        <a:rPr lang="en-US" sz="1200" b="1" dirty="0" smtClean="0">
-                          <a:solidFill>
-                            <a:schemeClr val="tx1"/>
-                          </a:solidFill>
-                          <a:latin typeface="Courier New" pitchFamily="49" charset="0"/>
-                        </a:rPr>
-                        <a:t>body</a:t>
-                      </a:r>
-                      <a:r>
-                        <a:rPr lang="en-US" sz="1200" b="0" dirty="0" smtClean="0">
-                          <a:solidFill>
-                            <a:schemeClr val="tx1"/>
-                          </a:solidFill>
-                          <a:latin typeface="Courier New" pitchFamily="49" charset="0"/>
-                        </a:rPr>
-                        <a:t> Task1 </a:t>
-                      </a:r>
-                      <a:r>
-                        <a:rPr lang="en-US" sz="1200" b="1" dirty="0" smtClean="0">
-                          <a:solidFill>
-                            <a:schemeClr val="tx1"/>
-                          </a:solidFill>
-                          <a:latin typeface="Courier New" pitchFamily="49" charset="0"/>
-                        </a:rPr>
-                        <a:t>is</a:t>
-                      </a:r>
-                    </a:p>
-                    <a:p>
-                      <a:r>
-                        <a:rPr lang="en-US" sz="1200" b="0" dirty="0" smtClean="0">
-                          <a:solidFill>
-                            <a:schemeClr val="tx1"/>
-                          </a:solidFill>
-                          <a:latin typeface="Courier New" pitchFamily="49" charset="0"/>
-                        </a:rPr>
-                        <a:t>      </a:t>
-                      </a:r>
-                      <a:r>
-                        <a:rPr lang="en-US" sz="1200" b="1" dirty="0" smtClean="0">
-                          <a:solidFill>
-                            <a:schemeClr val="tx1"/>
-                          </a:solidFill>
-                          <a:latin typeface="Courier New" pitchFamily="49" charset="0"/>
-                        </a:rPr>
-                        <a:t>begin</a:t>
-                      </a:r>
-                    </a:p>
-                    <a:p>
-                      <a:r>
-                        <a:rPr lang="en-US" sz="1200" b="0" dirty="0" smtClean="0">
-                          <a:solidFill>
-                            <a:schemeClr val="tx1"/>
-                          </a:solidFill>
-                          <a:latin typeface="Courier New" pitchFamily="49" charset="0"/>
-                        </a:rPr>
-                        <a:t>         </a:t>
-                      </a:r>
-                      <a:r>
-                        <a:rPr lang="en-US" sz="1200" b="1" dirty="0" smtClean="0">
-                          <a:solidFill>
-                            <a:schemeClr val="tx1"/>
-                          </a:solidFill>
-                          <a:latin typeface="Courier New" pitchFamily="49" charset="0"/>
-                        </a:rPr>
-                        <a:t>for</a:t>
-                      </a:r>
-                      <a:r>
-                        <a:rPr lang="en-US" sz="1200" b="0" dirty="0" smtClean="0">
-                          <a:solidFill>
-                            <a:schemeClr val="tx1"/>
-                          </a:solidFill>
-                          <a:latin typeface="Courier New" pitchFamily="49" charset="0"/>
-                        </a:rPr>
-                        <a:t> I </a:t>
-                      </a:r>
-                      <a:r>
-                        <a:rPr lang="en-US" sz="1200" b="1" dirty="0" smtClean="0">
-                          <a:solidFill>
-                            <a:schemeClr val="tx1"/>
-                          </a:solidFill>
-                          <a:latin typeface="Courier New" pitchFamily="49" charset="0"/>
-                        </a:rPr>
-                        <a:t>in</a:t>
-                      </a:r>
-                      <a:r>
-                        <a:rPr lang="en-US" sz="1200" b="0" dirty="0" smtClean="0">
-                          <a:solidFill>
-                            <a:schemeClr val="tx1"/>
-                          </a:solidFill>
-                          <a:latin typeface="Courier New" pitchFamily="49" charset="0"/>
-                        </a:rPr>
-                        <a:t> 1..100 </a:t>
-                      </a:r>
-                      <a:r>
-                        <a:rPr lang="en-US" sz="1200" b="1" dirty="0" smtClean="0">
-                          <a:solidFill>
-                            <a:schemeClr val="tx1"/>
-                          </a:solidFill>
-                          <a:latin typeface="Courier New" pitchFamily="49" charset="0"/>
-                        </a:rPr>
-                        <a:t>loop</a:t>
-                      </a:r>
-                    </a:p>
-                    <a:p>
-                      <a:r>
-                        <a:rPr lang="en-US" sz="1200" b="0" dirty="0" smtClean="0">
-                          <a:solidFill>
-                            <a:schemeClr val="tx1"/>
-                          </a:solidFill>
-                          <a:latin typeface="Courier New" pitchFamily="49" charset="0"/>
-                        </a:rPr>
-                        <a:t>            Variable := </a:t>
-                      </a:r>
-                      <a:r>
-                        <a:rPr lang="en-US" sz="1200" b="1" dirty="0" smtClean="0">
-                          <a:solidFill>
-                            <a:schemeClr val="tx1"/>
-                          </a:solidFill>
-                          <a:latin typeface="Courier New" pitchFamily="49" charset="0"/>
-                        </a:rPr>
-                        <a:t>not</a:t>
-                      </a:r>
-                      <a:r>
-                        <a:rPr lang="en-US" sz="1200" b="0" dirty="0" smtClean="0">
-                          <a:solidFill>
-                            <a:schemeClr val="tx1"/>
-                          </a:solidFill>
-                          <a:latin typeface="Courier New" pitchFamily="49" charset="0"/>
-                        </a:rPr>
-                        <a:t> Variable;</a:t>
-                      </a:r>
-                    </a:p>
-                    <a:p>
-                      <a:r>
-                        <a:rPr lang="en-US" sz="1200" b="0" baseline="0" dirty="0" smtClean="0">
-                          <a:solidFill>
-                            <a:schemeClr val="tx1"/>
-                          </a:solidFill>
-                          <a:latin typeface="Courier New" pitchFamily="49" charset="0"/>
-                        </a:rPr>
-                        <a:t>            </a:t>
-                      </a:r>
-                      <a:r>
-                        <a:rPr lang="en-US" sz="1200" b="0" dirty="0" err="1" smtClean="0">
-                          <a:solidFill>
-                            <a:schemeClr val="tx1"/>
-                          </a:solidFill>
-                          <a:latin typeface="Courier New" pitchFamily="49" charset="0"/>
-                        </a:rPr>
-                        <a:t>Put_Line</a:t>
-                      </a:r>
-                      <a:r>
-                        <a:rPr lang="en-US" sz="1200" b="0" dirty="0" smtClean="0">
-                          <a:solidFill>
-                            <a:schemeClr val="tx1"/>
-                          </a:solidFill>
-                          <a:latin typeface="Courier New" pitchFamily="49" charset="0"/>
-                        </a:rPr>
-                        <a:t>(</a:t>
-                      </a:r>
-                      <a:r>
-                        <a:rPr lang="en-US" sz="1200" b="0" dirty="0" err="1" smtClean="0">
-                          <a:solidFill>
-                            <a:schemeClr val="tx1"/>
-                          </a:solidFill>
-                          <a:latin typeface="Courier New" pitchFamily="49" charset="0"/>
-                        </a:rPr>
-                        <a:t>Variable'Img</a:t>
-                      </a:r>
-                      <a:r>
-                        <a:rPr lang="en-US" sz="1200" b="0" dirty="0" smtClean="0">
-                          <a:solidFill>
-                            <a:schemeClr val="tx1"/>
-                          </a:solidFill>
-                          <a:latin typeface="Courier New" pitchFamily="49" charset="0"/>
-                        </a:rPr>
-                        <a:t>);</a:t>
-                      </a:r>
-                    </a:p>
-                    <a:p>
-                      <a:r>
-                        <a:rPr lang="en-US" sz="1200" b="0" dirty="0" smtClean="0">
-                          <a:solidFill>
-                            <a:schemeClr val="tx1"/>
-                          </a:solidFill>
-                          <a:latin typeface="Courier New" pitchFamily="49" charset="0"/>
-                        </a:rPr>
-                        <a:t>            </a:t>
-                      </a:r>
-                      <a:r>
-                        <a:rPr lang="en-US" sz="1200" b="1" dirty="0" smtClean="0">
-                          <a:solidFill>
-                            <a:schemeClr val="tx1"/>
-                          </a:solidFill>
-                          <a:latin typeface="Courier New" pitchFamily="49" charset="0"/>
-                        </a:rPr>
-                        <a:t>delay</a:t>
-                      </a:r>
-                      <a:r>
-                        <a:rPr lang="en-US" sz="1200" b="0" dirty="0" smtClean="0">
-                          <a:solidFill>
-                            <a:schemeClr val="tx1"/>
-                          </a:solidFill>
-                          <a:latin typeface="Courier New" pitchFamily="49" charset="0"/>
-                        </a:rPr>
-                        <a:t> 0.2;</a:t>
-                      </a:r>
-                    </a:p>
-                    <a:p>
-                      <a:r>
-                        <a:rPr lang="en-US" sz="1200" b="0" dirty="0" smtClean="0">
-                          <a:solidFill>
-                            <a:schemeClr val="tx1"/>
-                          </a:solidFill>
-                          <a:latin typeface="Courier New" pitchFamily="49" charset="0"/>
-                        </a:rPr>
-                        <a:t>         end loop;</a:t>
-                      </a:r>
-                    </a:p>
-                    <a:p>
-                      <a:r>
-                        <a:rPr lang="en-US" sz="1200" b="0" dirty="0" smtClean="0">
-                          <a:solidFill>
-                            <a:schemeClr val="tx1"/>
-                          </a:solidFill>
-                          <a:latin typeface="Courier New" pitchFamily="49" charset="0"/>
-                        </a:rPr>
-                        <a:t>      end Task1;</a:t>
-                      </a:r>
-                    </a:p>
-                    <a:p>
-                      <a:r>
-                        <a:rPr lang="en-US" sz="1200" b="0" dirty="0" smtClean="0">
-                          <a:solidFill>
-                            <a:schemeClr val="tx1"/>
-                          </a:solidFill>
-                          <a:latin typeface="Courier New" pitchFamily="49" charset="0"/>
-                        </a:rPr>
-                        <a:t>      </a:t>
-                      </a:r>
-                    </a:p>
-                    <a:p>
-                      <a:r>
-                        <a:rPr lang="en-US" sz="1200" b="0" dirty="0" smtClean="0">
-                          <a:solidFill>
-                            <a:schemeClr val="tx1"/>
-                          </a:solidFill>
-                          <a:latin typeface="Courier New" pitchFamily="49" charset="0"/>
-                        </a:rPr>
-                        <a:t>      </a:t>
-                      </a:r>
-                      <a:r>
-                        <a:rPr lang="en-US" sz="1200" b="1" dirty="0" smtClean="0">
-                          <a:solidFill>
-                            <a:schemeClr val="tx1"/>
-                          </a:solidFill>
-                          <a:latin typeface="Courier New" pitchFamily="49" charset="0"/>
-                        </a:rPr>
-                        <a:t>task</a:t>
-                      </a:r>
-                      <a:r>
-                        <a:rPr lang="en-US" sz="1200" b="0" dirty="0" smtClean="0">
+                        <a:rPr lang="en-US" sz="1100" b="0" baseline="0" dirty="0" err="1" smtClean="0">
+                          <a:solidFill>
+                            <a:schemeClr val="tx1"/>
+                          </a:solidFill>
+                          <a:latin typeface="Courier New" pitchFamily="49" charset="0"/>
+                        </a:rPr>
+                        <a:t>Simple_Task</a:t>
+                      </a:r>
+                      <a:r>
+                        <a:rPr lang="en-US" sz="1100" b="0" baseline="0" dirty="0" smtClean="0">
+                          <a:solidFill>
+                            <a:schemeClr val="tx1"/>
+                          </a:solidFill>
+                          <a:latin typeface="Courier New" pitchFamily="49" charset="0"/>
+                        </a:rPr>
+                        <a:t>;</a:t>
+                      </a:r>
+                      <a:endParaRPr lang="en-US" sz="1100" b="0" dirty="0" smtClean="0">
+                        <a:solidFill>
+                          <a:schemeClr val="tx1"/>
+                        </a:solidFill>
+                        <a:latin typeface="Courier New" pitchFamily="49" charset="0"/>
+                      </a:endParaRPr>
+                    </a:p>
+                    <a:p>
+                      <a:endParaRPr lang="en-US" sz="1100" b="1" dirty="0" smtClean="0">
+                        <a:solidFill>
+                          <a:schemeClr val="tx1"/>
+                        </a:solidFill>
+                        <a:latin typeface="Courier New" pitchFamily="49" charset="0"/>
+                      </a:endParaRPr>
+                    </a:p>
+                    <a:p>
+                      <a:r>
+                        <a:rPr lang="en-US" sz="1100" b="1" dirty="0" smtClean="0">
+                          <a:solidFill>
+                            <a:schemeClr val="tx1"/>
+                          </a:solidFill>
+                          <a:latin typeface="Courier New" pitchFamily="49" charset="0"/>
+                        </a:rPr>
+                        <a:t>end</a:t>
+                      </a:r>
+                      <a:r>
+                        <a:rPr lang="en-US" sz="1100" b="0" baseline="0" dirty="0" smtClean="0">
                           <a:solidFill>
                             <a:schemeClr val="tx1"/>
                           </a:solidFill>
@@ -27272,313 +27254,25 @@
                         <a:t> </a:t>
                       </a:r>
                       <a:r>
-                        <a:rPr lang="en-US" sz="1200" b="1" dirty="0" smtClean="0">
-                          <a:solidFill>
-                            <a:schemeClr val="tx1"/>
-                          </a:solidFill>
-                          <a:latin typeface="Courier New" pitchFamily="49" charset="0"/>
-                        </a:rPr>
-                        <a:t>body</a:t>
-                      </a:r>
-                      <a:r>
-                        <a:rPr lang="en-US" sz="1200" b="0" dirty="0" smtClean="0">
-                          <a:solidFill>
-                            <a:schemeClr val="tx1"/>
-                          </a:solidFill>
-                          <a:latin typeface="Courier New" pitchFamily="49" charset="0"/>
-                        </a:rPr>
-                        <a:t> Task2 </a:t>
-                      </a:r>
-                      <a:r>
-                        <a:rPr lang="en-US" sz="1200" b="1" dirty="0" smtClean="0">
-                          <a:solidFill>
-                            <a:schemeClr val="tx1"/>
-                          </a:solidFill>
-                          <a:latin typeface="Courier New" pitchFamily="49" charset="0"/>
-                        </a:rPr>
-                        <a:t>is</a:t>
-                      </a:r>
-                    </a:p>
-                    <a:p>
-                      <a:r>
-                        <a:rPr lang="en-US" sz="1200" b="0" dirty="0" smtClean="0">
-                          <a:solidFill>
-                            <a:schemeClr val="tx1"/>
-                          </a:solidFill>
-                          <a:latin typeface="Courier New" pitchFamily="49" charset="0"/>
-                        </a:rPr>
-                        <a:t>      </a:t>
-                      </a:r>
-                      <a:r>
-                        <a:rPr lang="en-US" sz="1200" b="1" u="none" dirty="0" smtClean="0">
-                          <a:solidFill>
-                            <a:schemeClr val="tx1"/>
-                          </a:solidFill>
-                          <a:latin typeface="Courier New" pitchFamily="49" charset="0"/>
-                        </a:rPr>
-                        <a:t>begin</a:t>
-                      </a:r>
-                    </a:p>
-                    <a:p>
-                      <a:r>
-                        <a:rPr lang="en-US" sz="1200" b="0" dirty="0" smtClean="0">
-                          <a:solidFill>
-                            <a:schemeClr val="tx1"/>
-                          </a:solidFill>
-                          <a:latin typeface="Courier New" pitchFamily="49" charset="0"/>
-                        </a:rPr>
-                        <a:t>         </a:t>
-                      </a:r>
-                      <a:r>
-                        <a:rPr lang="en-US" sz="1200" b="1" dirty="0" smtClean="0">
-                          <a:solidFill>
-                            <a:schemeClr val="tx1"/>
-                          </a:solidFill>
-                          <a:latin typeface="Courier New" pitchFamily="49" charset="0"/>
-                        </a:rPr>
-                        <a:t>for</a:t>
-                      </a:r>
-                      <a:r>
-                        <a:rPr lang="en-US" sz="1200" b="0" dirty="0" smtClean="0">
-                          <a:solidFill>
-                            <a:schemeClr val="tx1"/>
-                          </a:solidFill>
-                          <a:latin typeface="Courier New" pitchFamily="49" charset="0"/>
-                        </a:rPr>
-                        <a:t> I </a:t>
-                      </a:r>
-                      <a:r>
-                        <a:rPr lang="en-US" sz="1200" b="1" dirty="0" smtClean="0">
-                          <a:solidFill>
-                            <a:schemeClr val="tx1"/>
-                          </a:solidFill>
-                          <a:latin typeface="Courier New" pitchFamily="49" charset="0"/>
-                        </a:rPr>
-                        <a:t>in</a:t>
-                      </a:r>
-                      <a:r>
-                        <a:rPr lang="en-US" sz="1200" b="0" dirty="0" smtClean="0">
-                          <a:solidFill>
-                            <a:schemeClr val="tx1"/>
-                          </a:solidFill>
-                          <a:latin typeface="Courier New" pitchFamily="49" charset="0"/>
-                        </a:rPr>
-                        <a:t> 1..100 </a:t>
-                      </a:r>
-                      <a:r>
-                        <a:rPr lang="en-US" sz="1200" b="1" dirty="0" smtClean="0">
-                          <a:solidFill>
-                            <a:schemeClr val="tx1"/>
-                          </a:solidFill>
-                          <a:latin typeface="Courier New" pitchFamily="49" charset="0"/>
-                        </a:rPr>
-                        <a:t>loop</a:t>
-                      </a:r>
-                    </a:p>
-                    <a:p>
-                      <a:r>
-                        <a:rPr lang="en-US" sz="1200" b="0" dirty="0" smtClean="0">
-                          <a:solidFill>
-                            <a:schemeClr val="tx1"/>
-                          </a:solidFill>
-                          <a:latin typeface="Courier New" pitchFamily="49" charset="0"/>
-                        </a:rPr>
-                        <a:t>            Variable := </a:t>
-                      </a:r>
-                      <a:r>
-                        <a:rPr lang="en-US" sz="1200" b="1" dirty="0" smtClean="0">
-                          <a:solidFill>
-                            <a:schemeClr val="tx1"/>
-                          </a:solidFill>
-                          <a:latin typeface="Courier New" pitchFamily="49" charset="0"/>
-                        </a:rPr>
-                        <a:t>not</a:t>
-                      </a:r>
-                      <a:r>
-                        <a:rPr lang="en-US" sz="1200" b="0" dirty="0" smtClean="0">
-                          <a:solidFill>
-                            <a:schemeClr val="tx1"/>
-                          </a:solidFill>
-                          <a:latin typeface="Courier New" pitchFamily="49" charset="0"/>
-                        </a:rPr>
-                        <a:t> Variable;</a:t>
-                      </a:r>
-                    </a:p>
-                    <a:p>
-                      <a:r>
-                        <a:rPr lang="en-US" sz="1200" b="0" baseline="0" dirty="0" smtClean="0">
-                          <a:solidFill>
-                            <a:schemeClr val="tx1"/>
-                          </a:solidFill>
-                          <a:latin typeface="Courier New" pitchFamily="49" charset="0"/>
-                        </a:rPr>
-                        <a:t>            </a:t>
-                      </a:r>
-                      <a:r>
-                        <a:rPr lang="en-US" sz="1200" b="0" dirty="0" err="1" smtClean="0">
-                          <a:solidFill>
-                            <a:schemeClr val="tx1"/>
-                          </a:solidFill>
-                          <a:latin typeface="Courier New" pitchFamily="49" charset="0"/>
-                        </a:rPr>
-                        <a:t>Put_Line</a:t>
-                      </a:r>
-                      <a:r>
-                        <a:rPr lang="en-US" sz="1200" b="0" dirty="0" smtClean="0">
-                          <a:solidFill>
-                            <a:schemeClr val="tx1"/>
-                          </a:solidFill>
-                          <a:latin typeface="Courier New" pitchFamily="49" charset="0"/>
-                        </a:rPr>
-                        <a:t>(</a:t>
-                      </a:r>
-                      <a:r>
-                        <a:rPr lang="en-US" sz="1200" b="0" dirty="0" err="1" smtClean="0">
-                          <a:solidFill>
-                            <a:schemeClr val="tx1"/>
-                          </a:solidFill>
-                          <a:latin typeface="Courier New" pitchFamily="49" charset="0"/>
-                        </a:rPr>
-                        <a:t>Variable'Img</a:t>
-                      </a:r>
-                      <a:r>
-                        <a:rPr lang="en-US" sz="1200" b="0" dirty="0" smtClean="0">
-                          <a:solidFill>
-                            <a:schemeClr val="tx1"/>
-                          </a:solidFill>
-                          <a:latin typeface="Courier New" pitchFamily="49" charset="0"/>
-                        </a:rPr>
-                        <a:t>);</a:t>
-                      </a:r>
-                    </a:p>
-                    <a:p>
-                      <a:r>
-                        <a:rPr lang="en-US" sz="1200" b="0" dirty="0" smtClean="0">
-                          <a:solidFill>
-                            <a:schemeClr val="tx1"/>
-                          </a:solidFill>
-                          <a:latin typeface="Courier New" pitchFamily="49" charset="0"/>
-                        </a:rPr>
-                        <a:t>            </a:t>
-                      </a:r>
-                      <a:r>
-                        <a:rPr lang="en-US" sz="1200" b="1" dirty="0" smtClean="0">
-                          <a:solidFill>
-                            <a:schemeClr val="tx1"/>
-                          </a:solidFill>
-                          <a:latin typeface="Courier New" pitchFamily="49" charset="0"/>
-                        </a:rPr>
-                        <a:t>delay</a:t>
-                      </a:r>
-                      <a:r>
-                        <a:rPr lang="en-US" sz="1200" b="0" dirty="0" smtClean="0">
-                          <a:solidFill>
-                            <a:schemeClr val="tx1"/>
-                          </a:solidFill>
-                          <a:latin typeface="Courier New" pitchFamily="49" charset="0"/>
-                        </a:rPr>
-                        <a:t> 0.2;</a:t>
-                      </a:r>
-                    </a:p>
-                    <a:p>
-                      <a:r>
-                        <a:rPr lang="en-US" sz="1200" b="0" dirty="0" smtClean="0">
-                          <a:solidFill>
-                            <a:schemeClr val="tx1"/>
-                          </a:solidFill>
-                          <a:latin typeface="Courier New" pitchFamily="49" charset="0"/>
-                        </a:rPr>
-                        <a:t>         </a:t>
-                      </a:r>
-                      <a:r>
-                        <a:rPr lang="en-US" sz="1200" b="1" dirty="0" smtClean="0">
-                          <a:solidFill>
-                            <a:schemeClr val="tx1"/>
-                          </a:solidFill>
-                          <a:latin typeface="Courier New" pitchFamily="49" charset="0"/>
-                        </a:rPr>
-                        <a:t>end</a:t>
-                      </a:r>
-                      <a:r>
-                        <a:rPr lang="en-US" sz="1200" b="0" dirty="0" smtClean="0">
-                          <a:solidFill>
-                            <a:schemeClr val="tx1"/>
-                          </a:solidFill>
-                          <a:latin typeface="Courier New" pitchFamily="49" charset="0"/>
-                        </a:rPr>
-                        <a:t> loop;</a:t>
-                      </a:r>
-                    </a:p>
-                    <a:p>
-                      <a:r>
-                        <a:rPr lang="en-US" sz="1200" b="0" dirty="0" smtClean="0">
-                          <a:solidFill>
-                            <a:schemeClr val="tx1"/>
-                          </a:solidFill>
-                          <a:latin typeface="Courier New" pitchFamily="49" charset="0"/>
-                        </a:rPr>
-                        <a:t>      </a:t>
-                      </a:r>
-                      <a:r>
-                        <a:rPr lang="en-US" sz="1200" b="1" dirty="0" smtClean="0">
-                          <a:solidFill>
-                            <a:schemeClr val="tx1"/>
-                          </a:solidFill>
-                          <a:latin typeface="Courier New" pitchFamily="49" charset="0"/>
-                        </a:rPr>
-                        <a:t>end</a:t>
-                      </a:r>
-                      <a:r>
-                        <a:rPr lang="en-US" sz="1200" b="0" dirty="0" smtClean="0">
-                          <a:solidFill>
-                            <a:schemeClr val="tx1"/>
-                          </a:solidFill>
-                          <a:latin typeface="Courier New" pitchFamily="49" charset="0"/>
-                        </a:rPr>
-                        <a:t> Task2;</a:t>
-                      </a:r>
-                    </a:p>
-                    <a:p>
-                      <a:r>
-                        <a:rPr lang="en-US" sz="1200" b="0" dirty="0" smtClean="0">
-                          <a:solidFill>
-                            <a:schemeClr val="tx1"/>
-                          </a:solidFill>
-                          <a:latin typeface="Courier New" pitchFamily="49" charset="0"/>
-                        </a:rPr>
-                        <a:t>   </a:t>
-                      </a:r>
-                      <a:r>
-                        <a:rPr lang="en-US" sz="1200" b="1" dirty="0" smtClean="0">
-                          <a:solidFill>
-                            <a:schemeClr val="tx1"/>
-                          </a:solidFill>
-                          <a:latin typeface="Courier New" pitchFamily="49" charset="0"/>
-                        </a:rPr>
-                        <a:t>begin</a:t>
-                      </a:r>
-                    </a:p>
-                    <a:p>
-                      <a:r>
-                        <a:rPr lang="en-US" sz="1200" b="0" dirty="0" smtClean="0">
-                          <a:solidFill>
-                            <a:schemeClr val="tx1"/>
-                          </a:solidFill>
-                          <a:latin typeface="Courier New" pitchFamily="49" charset="0"/>
-                        </a:rPr>
-                        <a:t>      </a:t>
-                      </a:r>
-                      <a:r>
-                        <a:rPr lang="en-US" sz="1200" b="1" dirty="0" smtClean="0">
-                          <a:solidFill>
-                            <a:schemeClr val="tx1"/>
-                          </a:solidFill>
-                          <a:latin typeface="Courier New" pitchFamily="49" charset="0"/>
-                        </a:rPr>
-                        <a:t>null</a:t>
-                      </a:r>
-                      <a:r>
-                        <a:rPr lang="en-US" sz="1200" b="0" dirty="0" smtClean="0">
+                        <a:rPr lang="en-US" sz="1100" b="0" dirty="0" err="1" smtClean="0">
+                          <a:solidFill>
+                            <a:schemeClr val="tx1"/>
+                          </a:solidFill>
+                          <a:latin typeface="Courier New" pitchFamily="49" charset="0"/>
+                        </a:rPr>
+                        <a:t>Simple_Tasking_Program</a:t>
+                      </a:r>
+                      <a:r>
+                        <a:rPr lang="en-US" sz="1100" b="0" dirty="0" smtClean="0">
+                          <a:solidFill>
+                            <a:schemeClr val="tx1"/>
+                          </a:solidFill>
+                          <a:latin typeface="Courier New" pitchFamily="49" charset="0"/>
+                        </a:rPr>
+                        <a:t> </a:t>
+                      </a:r>
+                      <a:r>
+                        <a:rPr lang="en-US" sz="1100" b="0" baseline="0" dirty="0" smtClean="0">
                           <a:solidFill>
                             <a:schemeClr val="tx1"/>
                           </a:solidFill>
@@ -27586,74 +27280,7 @@
                         </a:rPr>
                         <a:t>;</a:t>
                       </a:r>
-                    </a:p>
-                    <a:p>
-                      <a:r>
-                        <a:rPr lang="en-US" sz="1200" b="0" dirty="0" smtClean="0">
-                          <a:solidFill>
-                            <a:schemeClr val="tx1"/>
-                          </a:solidFill>
-                          <a:latin typeface="Courier New" pitchFamily="49" charset="0"/>
-                        </a:rPr>
-                        <a:t>   </a:t>
-                      </a:r>
-                      <a:r>
-                        <a:rPr lang="en-US" sz="1200" b="1" dirty="0" smtClean="0">
-                          <a:solidFill>
-                            <a:schemeClr val="tx1"/>
-                          </a:solidFill>
-                          <a:latin typeface="Courier New" pitchFamily="49" charset="0"/>
-                        </a:rPr>
-                        <a:t>end</a:t>
-                      </a:r>
-                      <a:r>
-                        <a:rPr lang="en-US" sz="1200" b="0" dirty="0" smtClean="0">
-                          <a:solidFill>
-                            <a:schemeClr val="tx1"/>
-                          </a:solidFill>
-                          <a:latin typeface="Courier New" pitchFamily="49" charset="0"/>
-                        </a:rPr>
-                        <a:t> </a:t>
-                      </a:r>
-                      <a:r>
-                        <a:rPr lang="en-US" sz="1200" b="0" dirty="0" err="1" smtClean="0">
-                          <a:solidFill>
-                            <a:schemeClr val="tx1"/>
-                          </a:solidFill>
-                          <a:latin typeface="Courier New" pitchFamily="49" charset="0"/>
-                        </a:rPr>
-                        <a:t>Two_Tasks</a:t>
-                      </a:r>
-                      <a:r>
-                        <a:rPr lang="en-US" sz="1200" b="0" dirty="0" smtClean="0">
-                          <a:solidFill>
-                            <a:schemeClr val="tx1"/>
-                          </a:solidFill>
-                          <a:latin typeface="Courier New" pitchFamily="49" charset="0"/>
-                        </a:rPr>
-                        <a:t>;</a:t>
-                      </a:r>
-                    </a:p>
-                    <a:p>
-                      <a:r>
-                        <a:rPr lang="en-US" sz="1200" b="1" dirty="0" smtClean="0">
-                          <a:solidFill>
-                            <a:schemeClr val="tx1"/>
-                          </a:solidFill>
-                          <a:latin typeface="Courier New" pitchFamily="49" charset="0"/>
-                        </a:rPr>
-                        <a:t>end</a:t>
-                      </a:r>
-                      <a:r>
-                        <a:rPr lang="en-US" sz="1200" b="0" dirty="0" smtClean="0">
-                          <a:solidFill>
-                            <a:schemeClr val="tx1"/>
-                          </a:solidFill>
-                          <a:latin typeface="Courier New" pitchFamily="49" charset="0"/>
-                        </a:rPr>
-                        <a:t> Main;</a:t>
-                      </a:r>
-                      <a:endParaRPr lang="en-US" sz="1200" b="0" i="1" dirty="0" smtClean="0">
+                      <a:endParaRPr lang="en-US" sz="1100" b="0" i="1" dirty="0" smtClean="0">
                         <a:solidFill>
                           <a:schemeClr val="tx1"/>
                         </a:solidFill>
@@ -27677,7 +27304,7 @@
     </p:spTree>
     <p:extLst>
       <p:ext uri="{BB962C8B-B14F-4D97-AF65-F5344CB8AC3E}">
-        <p14:creationId xmlns:p14="http://schemas.microsoft.com/office/powerpoint/2010/main" val="422194381"/>
+        <p14:creationId xmlns:p14="http://schemas.microsoft.com/office/powerpoint/2010/main" val="3583071772"/>
       </p:ext>
     </p:extLst>
   </p:cSld>
@@ -27706,7 +27333,7 @@
       </p:grpSpPr>
       <p:sp>
         <p:nvSpPr>
-          <p:cNvPr id="2" name="Title 1"/>
+          <p:cNvPr id="3" name="Title 2"/>
           <p:cNvSpPr>
             <a:spLocks noGrp="1"/>
           </p:cNvSpPr>
@@ -27721,7 +27348,7 @@
           <a:p>
             <a:r>
               <a:rPr lang="en-GB" dirty="0" smtClean="0"/>
-              <a:t>Answer (10/10)</a:t>
+              <a:t>(10/10)</a:t>
             </a:r>
             <a:endParaRPr lang="en-GB" dirty="0"/>
           </a:p>
@@ -27729,21 +27356,21 @@
       </p:sp>
       <p:graphicFrame>
         <p:nvGraphicFramePr>
-          <p:cNvPr id="4" name="Tableau 5"/>
+          <p:cNvPr id="5" name="Tableau 5"/>
           <p:cNvGraphicFramePr>
             <a:graphicFrameLocks noGrp="1"/>
           </p:cNvGraphicFramePr>
           <p:nvPr>
             <p:extLst>
               <p:ext uri="{D42A27DB-BD31-4B8C-83A1-F6EECF244321}">
-                <p14:modId xmlns:p14="http://schemas.microsoft.com/office/powerpoint/2010/main" val="1522170326"/>
+                <p14:modId xmlns:p14="http://schemas.microsoft.com/office/powerpoint/2010/main" val="980219943"/>
               </p:ext>
             </p:extLst>
           </p:nvPr>
         </p:nvGraphicFramePr>
         <p:xfrm>
-          <a:off x="1206668" y="894224"/>
-          <a:ext cx="6950361" cy="5577566"/>
+          <a:off x="2237606" y="1329797"/>
+          <a:ext cx="4668788" cy="3276326"/>
         </p:xfrm>
         <a:graphic>
           <a:graphicData uri="http://schemas.openxmlformats.org/drawingml/2006/table">
@@ -27752,34 +27379,25 @@
                 <a:tableStyleId>{5C22544A-7EE6-4342-B048-85BDC9FD1C3A}</a:tableStyleId>
               </a:tblPr>
               <a:tblGrid>
-                <a:gridCol w="6950361"/>
+                <a:gridCol w="4668788"/>
               </a:tblGrid>
-              <a:tr h="4415627">
+              <a:tr h="2913239">
                 <a:tc>
                   <a:txBody>
                     <a:bodyPr/>
                     <a:lstStyle/>
                     <a:p>
                       <a:r>
-                        <a:rPr lang="en-US" sz="1200" b="1" dirty="0" smtClean="0">
-                          <a:solidFill>
-                            <a:schemeClr val="tx1"/>
-                          </a:solidFill>
-                          <a:latin typeface="Courier New" pitchFamily="49" charset="0"/>
-                        </a:rPr>
-                        <a:t>with</a:t>
-                      </a:r>
-                      <a:r>
-                        <a:rPr lang="en-US" sz="1200" b="0" dirty="0" smtClean="0">
-                          <a:solidFill>
-                            <a:schemeClr val="tx1"/>
-                          </a:solidFill>
-                          <a:latin typeface="Courier New" pitchFamily="49" charset="0"/>
-                        </a:rPr>
-                        <a:t> </a:t>
-                      </a:r>
-                      <a:r>
-                        <a:rPr lang="en-US" sz="1200" b="0" dirty="0" err="1" smtClean="0">
+                        <a:rPr lang="en-US" sz="1100" b="1" dirty="0" smtClean="0">
+                          <a:solidFill>
+                            <a:schemeClr val="tx1"/>
+                          </a:solidFill>
+                          <a:latin typeface="Courier New" pitchFamily="49" charset="0"/>
+                        </a:rPr>
+                        <a:t>with </a:t>
+                      </a:r>
+                      <a:r>
+                        <a:rPr lang="en-US" sz="1100" b="0" dirty="0" err="1" smtClean="0">
                           <a:solidFill>
                             <a:schemeClr val="tx1"/>
                           </a:solidFill>
@@ -27788,43 +27406,7 @@
                         <a:t>Ada.Text_IO</a:t>
                       </a:r>
                       <a:r>
-                        <a:rPr lang="en-US" sz="1200" b="0" dirty="0" smtClean="0">
-                          <a:solidFill>
-                            <a:schemeClr val="tx1"/>
-                          </a:solidFill>
-                          <a:latin typeface="Courier New" pitchFamily="49" charset="0"/>
-                        </a:rPr>
-                        <a:t>; </a:t>
-                      </a:r>
-                      <a:r>
-                        <a:rPr lang="en-US" sz="1200" b="1" dirty="0" smtClean="0">
-                          <a:solidFill>
-                            <a:schemeClr val="tx1"/>
-                          </a:solidFill>
-                          <a:latin typeface="Courier New" pitchFamily="49" charset="0"/>
-                        </a:rPr>
-                        <a:t>use</a:t>
-                      </a:r>
-                      <a:r>
-                        <a:rPr lang="en-US" sz="1200" b="0" dirty="0" smtClean="0">
-                          <a:solidFill>
-                            <a:schemeClr val="tx1"/>
-                          </a:solidFill>
-                          <a:latin typeface="Courier New" pitchFamily="49" charset="0"/>
-                        </a:rPr>
-                        <a:t> </a:t>
-                      </a:r>
-                      <a:r>
-                        <a:rPr lang="en-US" sz="1200" b="0" dirty="0" err="1" smtClean="0">
-                          <a:solidFill>
-                            <a:schemeClr val="tx1"/>
-                          </a:solidFill>
-                          <a:latin typeface="Courier New" pitchFamily="49" charset="0"/>
-                        </a:rPr>
-                        <a:t>Ada.Text_IO</a:t>
-                      </a:r>
-                      <a:r>
-                        <a:rPr lang="en-US" sz="1200" b="0" dirty="0" smtClean="0">
+                        <a:rPr lang="en-US" sz="1100" b="0" dirty="0" smtClean="0">
                           <a:solidFill>
                             <a:schemeClr val="tx1"/>
                           </a:solidFill>
@@ -27832,9 +27414,7 @@
                         </a:rPr>
                         <a:t>;</a:t>
                       </a:r>
-                    </a:p>
-                    <a:p>
-                      <a:endParaRPr lang="en-US" sz="1200" b="0" dirty="0" smtClean="0">
+                      <a:endParaRPr lang="en-US" sz="1100" b="1" dirty="0" smtClean="0">
                         <a:solidFill>
                           <a:schemeClr val="tx1"/>
                         </a:solidFill>
@@ -27842,172 +27422,7 @@
                       </a:endParaRPr>
                     </a:p>
                     <a:p>
-                      <a:r>
-                        <a:rPr lang="en-US" sz="1200" b="1" dirty="0" smtClean="0">
-                          <a:solidFill>
-                            <a:schemeClr val="tx1"/>
-                          </a:solidFill>
-                          <a:latin typeface="Courier New" pitchFamily="49" charset="0"/>
-                        </a:rPr>
-                        <a:t>procedure</a:t>
-                      </a:r>
-                      <a:r>
-                        <a:rPr lang="en-US" sz="1200" b="0" dirty="0" smtClean="0">
-                          <a:solidFill>
-                            <a:schemeClr val="tx1"/>
-                          </a:solidFill>
-                          <a:latin typeface="Courier New" pitchFamily="49" charset="0"/>
-                        </a:rPr>
-                        <a:t> Main </a:t>
-                      </a:r>
-                      <a:r>
-                        <a:rPr lang="en-US" sz="1200" b="1" dirty="0" smtClean="0">
-                          <a:solidFill>
-                            <a:schemeClr val="tx1"/>
-                          </a:solidFill>
-                          <a:latin typeface="Courier New" pitchFamily="49" charset="0"/>
-                        </a:rPr>
-                        <a:t>is</a:t>
-                      </a:r>
-                    </a:p>
-                    <a:p>
-                      <a:r>
-                        <a:rPr lang="en-US" sz="1200" b="0" dirty="0" smtClean="0">
-                          <a:solidFill>
-                            <a:schemeClr val="tx1"/>
-                          </a:solidFill>
-                          <a:latin typeface="Courier New" pitchFamily="49" charset="0"/>
-                        </a:rPr>
-                        <a:t>   Variable : </a:t>
-                      </a:r>
-                      <a:r>
-                        <a:rPr lang="en-US" sz="1200" b="1" dirty="0" smtClean="0">
-                          <a:solidFill>
-                            <a:schemeClr val="tx1"/>
-                          </a:solidFill>
-                          <a:latin typeface="Courier New" pitchFamily="49" charset="0"/>
-                        </a:rPr>
-                        <a:t>Boolean</a:t>
-                      </a:r>
-                      <a:r>
-                        <a:rPr lang="en-US" sz="1200" b="0" dirty="0" smtClean="0">
-                          <a:solidFill>
-                            <a:schemeClr val="tx1"/>
-                          </a:solidFill>
-                          <a:latin typeface="Courier New" pitchFamily="49" charset="0"/>
-                        </a:rPr>
-                        <a:t> := True;        </a:t>
-                      </a:r>
-                    </a:p>
-                    <a:p>
-                      <a:r>
-                        <a:rPr lang="en-US" sz="1200" b="1" dirty="0" smtClean="0">
-                          <a:solidFill>
-                            <a:schemeClr val="tx1"/>
-                          </a:solidFill>
-                          <a:latin typeface="Courier New" pitchFamily="49" charset="0"/>
-                        </a:rPr>
-                        <a:t>begin</a:t>
-                      </a:r>
-                    </a:p>
-                    <a:p>
-                      <a:r>
-                        <a:rPr lang="en-US" sz="1200" b="0" dirty="0" smtClean="0">
-                          <a:solidFill>
-                            <a:schemeClr val="tx1"/>
-                          </a:solidFill>
-                          <a:latin typeface="Courier New" pitchFamily="49" charset="0"/>
-                        </a:rPr>
-                        <a:t>   </a:t>
-                      </a:r>
-                      <a:r>
-                        <a:rPr lang="en-US" sz="1200" b="0" dirty="0" err="1" smtClean="0">
-                          <a:solidFill>
-                            <a:schemeClr val="tx1"/>
-                          </a:solidFill>
-                          <a:latin typeface="Courier New" pitchFamily="49" charset="0"/>
-                        </a:rPr>
-                        <a:t>Two_Tasks</a:t>
-                      </a:r>
-                      <a:r>
-                        <a:rPr lang="en-US" sz="1200" b="0" dirty="0" smtClean="0">
-                          <a:solidFill>
-                            <a:schemeClr val="tx1"/>
-                          </a:solidFill>
-                          <a:latin typeface="Courier New" pitchFamily="49" charset="0"/>
-                        </a:rPr>
-                        <a:t>:</a:t>
-                      </a:r>
-                    </a:p>
-                    <a:p>
-                      <a:r>
-                        <a:rPr lang="en-US" sz="1200" b="0" dirty="0" smtClean="0">
-                          <a:solidFill>
-                            <a:schemeClr val="tx1"/>
-                          </a:solidFill>
-                          <a:latin typeface="Courier New" pitchFamily="49" charset="0"/>
-                        </a:rPr>
-                        <a:t>   </a:t>
-                      </a:r>
-                      <a:r>
-                        <a:rPr lang="en-US" sz="1200" b="1" dirty="0" smtClean="0">
-                          <a:solidFill>
-                            <a:schemeClr val="tx1"/>
-                          </a:solidFill>
-                          <a:latin typeface="Courier New" pitchFamily="49" charset="0"/>
-                        </a:rPr>
-                        <a:t>declare</a:t>
-                      </a:r>
-                    </a:p>
-                    <a:p>
-                      <a:r>
-                        <a:rPr lang="en-US" sz="1200" b="0" dirty="0" smtClean="0">
-                          <a:solidFill>
-                            <a:schemeClr val="tx1"/>
-                          </a:solidFill>
-                          <a:latin typeface="Courier New" pitchFamily="49" charset="0"/>
-                        </a:rPr>
-                        <a:t>      </a:t>
-                      </a:r>
-                      <a:r>
-                        <a:rPr lang="en-US" sz="1200" b="1" dirty="0" smtClean="0">
-                          <a:solidFill>
-                            <a:schemeClr val="tx1"/>
-                          </a:solidFill>
-                          <a:latin typeface="Courier New" pitchFamily="49" charset="0"/>
-                        </a:rPr>
-                        <a:t>task</a:t>
-                      </a:r>
-                      <a:r>
-                        <a:rPr lang="en-US" sz="1200" b="0" dirty="0" smtClean="0">
-                          <a:solidFill>
-                            <a:schemeClr val="tx1"/>
-                          </a:solidFill>
-                          <a:latin typeface="Courier New" pitchFamily="49" charset="0"/>
-                        </a:rPr>
-                        <a:t> Task1; </a:t>
-                      </a:r>
-                      <a:r>
-                        <a:rPr lang="en-US" sz="1200" b="1" dirty="0" smtClean="0">
-                          <a:solidFill>
-                            <a:schemeClr val="tx1"/>
-                          </a:solidFill>
-                          <a:latin typeface="Courier New" pitchFamily="49" charset="0"/>
-                        </a:rPr>
-                        <a:t>task</a:t>
-                      </a:r>
-                      <a:r>
-                        <a:rPr lang="en-US" sz="1200" b="0" dirty="0" smtClean="0">
-                          <a:solidFill>
-                            <a:schemeClr val="tx1"/>
-                          </a:solidFill>
-                          <a:latin typeface="Courier New" pitchFamily="49" charset="0"/>
-                        </a:rPr>
-                        <a:t> Task2;</a:t>
-                      </a:r>
-                    </a:p>
-                    <a:p>
-                      <a:endParaRPr lang="en-US" sz="1200" b="0" dirty="0" smtClean="0">
+                      <a:endParaRPr lang="en-US" sz="1100" b="1" dirty="0" smtClean="0">
                         <a:solidFill>
                           <a:schemeClr val="tx1"/>
                         </a:solidFill>
@@ -28016,7 +27431,258 @@
                     </a:p>
                     <a:p>
                       <a:r>
-                        <a:rPr lang="en-US" sz="1200" b="0" dirty="0" smtClean="0">
+                        <a:rPr lang="en-US" sz="1100" b="1" dirty="0" smtClean="0">
+                          <a:solidFill>
+                            <a:schemeClr val="tx1"/>
+                          </a:solidFill>
+                          <a:latin typeface="Courier New" pitchFamily="49" charset="0"/>
+                        </a:rPr>
+                        <a:t>procedure</a:t>
+                      </a:r>
+                      <a:r>
+                        <a:rPr lang="en-US" sz="1100" b="0" dirty="0" smtClean="0">
+                          <a:solidFill>
+                            <a:schemeClr val="tx1"/>
+                          </a:solidFill>
+                          <a:latin typeface="Courier New" pitchFamily="49" charset="0"/>
+                        </a:rPr>
+                        <a:t> </a:t>
+                      </a:r>
+                      <a:r>
+                        <a:rPr lang="en-US" sz="1100" b="0" dirty="0" err="1" smtClean="0">
+                          <a:solidFill>
+                            <a:schemeClr val="tx1"/>
+                          </a:solidFill>
+                          <a:latin typeface="Courier New" pitchFamily="49" charset="0"/>
+                        </a:rPr>
+                        <a:t>Simple_Tasking_Program</a:t>
+                      </a:r>
+                      <a:r>
+                        <a:rPr lang="en-US" sz="1100" b="0" dirty="0" smtClean="0">
+                          <a:solidFill>
+                            <a:schemeClr val="tx1"/>
+                          </a:solidFill>
+                          <a:latin typeface="Courier New" pitchFamily="49" charset="0"/>
+                        </a:rPr>
+                        <a:t> </a:t>
+                      </a:r>
+                      <a:r>
+                        <a:rPr lang="en-US" sz="1100" b="1" dirty="0" smtClean="0">
+                          <a:solidFill>
+                            <a:schemeClr val="tx1"/>
+                          </a:solidFill>
+                          <a:latin typeface="Courier New" pitchFamily="49" charset="0"/>
+                        </a:rPr>
+                        <a:t>is</a:t>
+                      </a:r>
+                    </a:p>
+                    <a:p>
+                      <a:endParaRPr lang="en-US" sz="1100" b="0" dirty="0" smtClean="0">
+                        <a:solidFill>
+                          <a:schemeClr val="tx1"/>
+                        </a:solidFill>
+                        <a:latin typeface="Courier New" pitchFamily="49" charset="0"/>
+                      </a:endParaRPr>
+                    </a:p>
+                    <a:p>
+                      <a:r>
+                        <a:rPr lang="en-US" sz="1100" b="0" dirty="0" smtClean="0">
+                          <a:solidFill>
+                            <a:schemeClr val="tx1"/>
+                          </a:solidFill>
+                          <a:latin typeface="Courier New" pitchFamily="49" charset="0"/>
+                        </a:rPr>
+                        <a:t>   </a:t>
+                      </a:r>
+                      <a:r>
+                        <a:rPr lang="en-US" sz="1100" b="0" dirty="0" smtClean="0">
+                          <a:solidFill>
+                            <a:schemeClr val="tx1"/>
+                          </a:solidFill>
+                          <a:latin typeface="Courier New" pitchFamily="49" charset="0"/>
+                        </a:rPr>
+                        <a:t>N : Integer := 60</a:t>
+                      </a:r>
+                      <a:r>
+                        <a:rPr lang="en-US" sz="1100" b="0" dirty="0" smtClean="0">
+                          <a:solidFill>
+                            <a:schemeClr val="tx1"/>
+                          </a:solidFill>
+                          <a:latin typeface="Courier New" pitchFamily="49" charset="0"/>
+                        </a:rPr>
+                        <a:t>;</a:t>
+                      </a:r>
+                    </a:p>
+                    <a:p>
+                      <a:endParaRPr lang="en-US" sz="1100" b="0" dirty="0" smtClean="0">
+                        <a:solidFill>
+                          <a:schemeClr val="tx1"/>
+                        </a:solidFill>
+                        <a:latin typeface="Courier New" pitchFamily="49" charset="0"/>
+                      </a:endParaRPr>
+                    </a:p>
+                    <a:p>
+                      <a:r>
+                        <a:rPr lang="en-US" sz="1100" b="0" dirty="0" smtClean="0">
+                          <a:solidFill>
+                            <a:schemeClr val="tx1"/>
+                          </a:solidFill>
+                          <a:latin typeface="Courier New" pitchFamily="49" charset="0"/>
+                        </a:rPr>
+                        <a:t>   </a:t>
+                      </a:r>
+                      <a:r>
+                        <a:rPr lang="en-US" sz="1100" b="1" dirty="0" smtClean="0">
+                          <a:solidFill>
+                            <a:schemeClr val="tx1"/>
+                          </a:solidFill>
+                          <a:latin typeface="Courier New" pitchFamily="49" charset="0"/>
+                        </a:rPr>
+                        <a:t>task</a:t>
+                      </a:r>
+                      <a:r>
+                        <a:rPr lang="en-US" sz="1100" b="0" dirty="0" smtClean="0">
+                          <a:solidFill>
+                            <a:schemeClr val="tx1"/>
+                          </a:solidFill>
+                          <a:latin typeface="Courier New" pitchFamily="49" charset="0"/>
+                        </a:rPr>
+                        <a:t> </a:t>
+                      </a:r>
+                      <a:r>
+                        <a:rPr lang="en-US" sz="1100" b="0" dirty="0" err="1" smtClean="0">
+                          <a:solidFill>
+                            <a:schemeClr val="tx1"/>
+                          </a:solidFill>
+                          <a:latin typeface="Courier New" pitchFamily="49" charset="0"/>
+                        </a:rPr>
+                        <a:t>Simple_Task</a:t>
+                      </a:r>
+                      <a:r>
+                        <a:rPr lang="en-US" sz="1100" b="0" dirty="0" smtClean="0">
+                          <a:solidFill>
+                            <a:schemeClr val="tx1"/>
+                          </a:solidFill>
+                          <a:latin typeface="Courier New" pitchFamily="49" charset="0"/>
+                        </a:rPr>
+                        <a:t>;</a:t>
+                      </a:r>
+                    </a:p>
+                    <a:p>
+                      <a:endParaRPr lang="en-US" sz="1100" b="0" dirty="0" smtClean="0">
+                        <a:solidFill>
+                          <a:schemeClr val="tx1"/>
+                        </a:solidFill>
+                        <a:latin typeface="Courier New" pitchFamily="49" charset="0"/>
+                      </a:endParaRPr>
+                    </a:p>
+                    <a:p>
+                      <a:r>
+                        <a:rPr lang="en-US" sz="1100" b="1" dirty="0" smtClean="0">
+                          <a:solidFill>
+                            <a:schemeClr val="tx1"/>
+                          </a:solidFill>
+                          <a:latin typeface="Courier New" pitchFamily="49" charset="0"/>
+                        </a:rPr>
+                        <a:t>begin</a:t>
+                      </a:r>
+                    </a:p>
+                    <a:p>
+                      <a:endParaRPr lang="en-US" sz="1100" b="0" dirty="0" smtClean="0">
+                        <a:solidFill>
+                          <a:schemeClr val="tx1"/>
+                        </a:solidFill>
+                        <a:latin typeface="Courier New" pitchFamily="49" charset="0"/>
+                      </a:endParaRPr>
+                    </a:p>
+                    <a:p>
+                      <a:r>
+                        <a:rPr lang="en-US" sz="1100" b="0" dirty="0" smtClean="0">
+                          <a:solidFill>
+                            <a:schemeClr val="tx1"/>
+                          </a:solidFill>
+                          <a:latin typeface="Courier New" pitchFamily="49" charset="0"/>
+                        </a:rPr>
+                        <a:t>   </a:t>
+                      </a:r>
+                      <a:r>
+                        <a:rPr lang="en-US" sz="1100" b="1" dirty="0" smtClean="0">
+                          <a:solidFill>
+                            <a:schemeClr val="tx1"/>
+                          </a:solidFill>
+                          <a:latin typeface="Courier New" pitchFamily="49" charset="0"/>
+                        </a:rPr>
+                        <a:t>task</a:t>
+                      </a:r>
+                      <a:r>
+                        <a:rPr lang="en-US" sz="1100" b="1" baseline="0" dirty="0" smtClean="0">
+                          <a:solidFill>
+                            <a:schemeClr val="tx1"/>
+                          </a:solidFill>
+                          <a:latin typeface="Courier New" pitchFamily="49" charset="0"/>
+                        </a:rPr>
+                        <a:t> body</a:t>
+                      </a:r>
+                      <a:r>
+                        <a:rPr lang="en-US" sz="1100" b="0" baseline="0" dirty="0" smtClean="0">
+                          <a:solidFill>
+                            <a:schemeClr val="tx1"/>
+                          </a:solidFill>
+                          <a:latin typeface="Courier New" pitchFamily="49" charset="0"/>
+                        </a:rPr>
+                        <a:t> </a:t>
+                      </a:r>
+                      <a:r>
+                        <a:rPr lang="en-US" sz="1100" b="0" baseline="0" dirty="0" err="1" smtClean="0">
+                          <a:solidFill>
+                            <a:schemeClr val="tx1"/>
+                          </a:solidFill>
+                          <a:latin typeface="Courier New" pitchFamily="49" charset="0"/>
+                        </a:rPr>
+                        <a:t>Simple_Task</a:t>
+                      </a:r>
+                      <a:r>
+                        <a:rPr lang="en-US" sz="1100" b="0" baseline="0" dirty="0" smtClean="0">
+                          <a:solidFill>
+                            <a:schemeClr val="tx1"/>
+                          </a:solidFill>
+                          <a:latin typeface="Courier New" pitchFamily="49" charset="0"/>
+                        </a:rPr>
+                        <a:t> </a:t>
+                      </a:r>
+                      <a:r>
+                        <a:rPr lang="en-US" sz="1100" b="1" baseline="0" dirty="0" smtClean="0">
+                          <a:solidFill>
+                            <a:schemeClr val="tx1"/>
+                          </a:solidFill>
+                          <a:latin typeface="Courier New" pitchFamily="49" charset="0"/>
+                        </a:rPr>
+                        <a:t>is</a:t>
+                      </a:r>
+                    </a:p>
+                    <a:p>
+                      <a:r>
+                        <a:rPr lang="en-US" sz="1100" b="0" baseline="0" dirty="0" smtClean="0">
+                          <a:solidFill>
+                            <a:schemeClr val="tx1"/>
+                          </a:solidFill>
+                          <a:latin typeface="Courier New" pitchFamily="49" charset="0"/>
+                        </a:rPr>
+                        <a:t>   </a:t>
+                      </a:r>
+                      <a:r>
+                        <a:rPr lang="en-US" sz="1100" b="1" baseline="0" dirty="0" smtClean="0">
+                          <a:solidFill>
+                            <a:schemeClr val="tx1"/>
+                          </a:solidFill>
+                          <a:latin typeface="Courier New" pitchFamily="49" charset="0"/>
+                        </a:rPr>
+                        <a:t>begin</a:t>
+                      </a:r>
+                    </a:p>
+                    <a:p>
+                      <a:r>
+                        <a:rPr lang="en-US" sz="1100" b="0" baseline="0" dirty="0" smtClean="0">
                           <a:solidFill>
                             <a:schemeClr val="tx1"/>
                           </a:solidFill>
@@ -28025,16 +27691,177 @@
                         <a:t>      </a:t>
                       </a:r>
                       <a:r>
-                        <a:rPr lang="en-US" sz="1200" b="1" dirty="0" smtClean="0">
-                          <a:solidFill>
-                            <a:schemeClr val="tx1"/>
-                          </a:solidFill>
-                          <a:latin typeface="Courier New" pitchFamily="49" charset="0"/>
-                        </a:rPr>
-                        <a:t>task</a:t>
-                      </a:r>
-                      <a:r>
-                        <a:rPr lang="en-US" sz="1200" b="0" dirty="0" smtClean="0">
+                        <a:rPr lang="en-US" sz="1100" b="1" baseline="0" dirty="0" smtClean="0">
+                          <a:solidFill>
+                            <a:schemeClr val="tx1"/>
+                          </a:solidFill>
+                          <a:latin typeface="Courier New" pitchFamily="49" charset="0"/>
+                        </a:rPr>
+                        <a:t>for</a:t>
+                      </a:r>
+                      <a:r>
+                        <a:rPr lang="en-US" sz="1100" b="0" baseline="0" dirty="0" smtClean="0">
+                          <a:solidFill>
+                            <a:schemeClr val="tx1"/>
+                          </a:solidFill>
+                          <a:latin typeface="Courier New" pitchFamily="49" charset="0"/>
+                        </a:rPr>
+                        <a:t> I </a:t>
+                      </a:r>
+                      <a:r>
+                        <a:rPr lang="en-US" sz="1100" b="1" baseline="0" dirty="0" smtClean="0">
+                          <a:solidFill>
+                            <a:schemeClr val="tx1"/>
+                          </a:solidFill>
+                          <a:latin typeface="Courier New" pitchFamily="49" charset="0"/>
+                        </a:rPr>
+                        <a:t>in</a:t>
+                      </a:r>
+                      <a:r>
+                        <a:rPr lang="en-US" sz="1100" b="0" baseline="0" dirty="0" smtClean="0">
+                          <a:solidFill>
+                            <a:schemeClr val="tx1"/>
+                          </a:solidFill>
+                          <a:latin typeface="Courier New" pitchFamily="49" charset="0"/>
+                        </a:rPr>
+                        <a:t> 1..N </a:t>
+                      </a:r>
+                      <a:r>
+                        <a:rPr lang="en-US" sz="1100" b="1" baseline="0" dirty="0" smtClean="0">
+                          <a:solidFill>
+                            <a:schemeClr val="tx1"/>
+                          </a:solidFill>
+                          <a:latin typeface="Courier New" pitchFamily="49" charset="0"/>
+                        </a:rPr>
+                        <a:t>loop</a:t>
+                      </a:r>
+                    </a:p>
+                    <a:p>
+                      <a:r>
+                        <a:rPr lang="en-US" sz="1100" b="0" baseline="0" dirty="0" smtClean="0">
+                          <a:solidFill>
+                            <a:schemeClr val="tx1"/>
+                          </a:solidFill>
+                          <a:latin typeface="Courier New" pitchFamily="49" charset="0"/>
+                        </a:rPr>
+                        <a:t>         </a:t>
+                      </a:r>
+                      <a:r>
+                        <a:rPr lang="en-US" sz="1100" b="0" baseline="0" dirty="0" err="1" smtClean="0">
+                          <a:solidFill>
+                            <a:schemeClr val="tx1"/>
+                          </a:solidFill>
+                          <a:latin typeface="Courier New" pitchFamily="49" charset="0"/>
+                        </a:rPr>
+                        <a:t>Ada.Text_IO.Put_Line</a:t>
+                      </a:r>
+                      <a:r>
+                        <a:rPr lang="en-US" sz="1100" b="0" baseline="0" dirty="0" smtClean="0">
+                          <a:solidFill>
+                            <a:schemeClr val="tx1"/>
+                          </a:solidFill>
+                          <a:latin typeface="Courier New" pitchFamily="49" charset="0"/>
+                        </a:rPr>
+                        <a:t> ("Hello");</a:t>
+                      </a:r>
+                    </a:p>
+                    <a:p>
+                      <a:r>
+                        <a:rPr lang="en-US" sz="1100" b="0" baseline="0" dirty="0" smtClean="0">
+                          <a:solidFill>
+                            <a:schemeClr val="tx1"/>
+                          </a:solidFill>
+                          <a:latin typeface="Courier New" pitchFamily="49" charset="0"/>
+                        </a:rPr>
+                        <a:t>         </a:t>
+                      </a:r>
+                      <a:r>
+                        <a:rPr lang="en-US" sz="1100" b="1" baseline="0" dirty="0" smtClean="0">
+                          <a:solidFill>
+                            <a:schemeClr val="tx1"/>
+                          </a:solidFill>
+                          <a:latin typeface="Courier New" pitchFamily="49" charset="0"/>
+                        </a:rPr>
+                        <a:t>delay</a:t>
+                      </a:r>
+                      <a:r>
+                        <a:rPr lang="en-US" sz="1100" b="0" baseline="0" dirty="0" smtClean="0">
+                          <a:solidFill>
+                            <a:schemeClr val="tx1"/>
+                          </a:solidFill>
+                          <a:latin typeface="Courier New" pitchFamily="49" charset="0"/>
+                        </a:rPr>
+                        <a:t> 1.0</a:t>
+                      </a:r>
+                      <a:r>
+                        <a:rPr lang="en-US" sz="1100" b="0" baseline="0" dirty="0" smtClean="0">
+                          <a:solidFill>
+                            <a:schemeClr val="tx1"/>
+                          </a:solidFill>
+                          <a:latin typeface="Courier New" pitchFamily="49" charset="0"/>
+                        </a:rPr>
+                        <a:t>;</a:t>
+                      </a:r>
+                    </a:p>
+                    <a:p>
+                      <a:r>
+                        <a:rPr lang="en-US" sz="1100" b="0" baseline="0" dirty="0" smtClean="0">
+                          <a:solidFill>
+                            <a:schemeClr val="tx1"/>
+                          </a:solidFill>
+                          <a:latin typeface="Courier New" pitchFamily="49" charset="0"/>
+                        </a:rPr>
+                        <a:t>      </a:t>
+                      </a:r>
+                      <a:r>
+                        <a:rPr lang="en-US" sz="1100" b="1" baseline="0" dirty="0" smtClean="0">
+                          <a:solidFill>
+                            <a:schemeClr val="tx1"/>
+                          </a:solidFill>
+                          <a:latin typeface="Courier New" pitchFamily="49" charset="0"/>
+                        </a:rPr>
+                        <a:t>end </a:t>
+                      </a:r>
+                      <a:r>
+                        <a:rPr lang="en-US" sz="1100" b="1" baseline="0" dirty="0" smtClean="0">
+                          <a:solidFill>
+                            <a:schemeClr val="tx1"/>
+                          </a:solidFill>
+                          <a:latin typeface="Courier New" pitchFamily="49" charset="0"/>
+                        </a:rPr>
+                        <a:t>loop</a:t>
+                      </a:r>
+                      <a:r>
+                        <a:rPr lang="en-US" sz="1100" b="0" baseline="0" dirty="0" smtClean="0">
+                          <a:solidFill>
+                            <a:schemeClr val="tx1"/>
+                          </a:solidFill>
+                          <a:latin typeface="Courier New" pitchFamily="49" charset="0"/>
+                        </a:rPr>
+                        <a:t>;</a:t>
+                      </a:r>
+                    </a:p>
+                    <a:p>
+                      <a:r>
+                        <a:rPr lang="en-US" sz="1100" b="0" baseline="0" dirty="0" smtClean="0">
+                          <a:solidFill>
+                            <a:schemeClr val="tx1"/>
+                          </a:solidFill>
+                          <a:latin typeface="Courier New" pitchFamily="49" charset="0"/>
+                        </a:rPr>
+                        <a:t>   </a:t>
+                      </a:r>
+                      <a:r>
+                        <a:rPr lang="en-US" sz="1100" b="1" baseline="0" dirty="0" smtClean="0">
+                          <a:solidFill>
+                            <a:schemeClr val="tx1"/>
+                          </a:solidFill>
+                          <a:latin typeface="Courier New" pitchFamily="49" charset="0"/>
+                        </a:rPr>
+                        <a:t>end</a:t>
+                      </a:r>
+                      <a:r>
+                        <a:rPr lang="en-US" sz="1100" b="0" baseline="0" dirty="0" smtClean="0">
                           <a:solidFill>
                             <a:schemeClr val="tx1"/>
                           </a:solidFill>
@@ -28043,268 +27870,50 @@
                         <a:t> </a:t>
                       </a:r>
                       <a:r>
-                        <a:rPr lang="en-US" sz="1200" b="1" dirty="0" smtClean="0">
-                          <a:solidFill>
-                            <a:schemeClr val="tx1"/>
-                          </a:solidFill>
-                          <a:latin typeface="Courier New" pitchFamily="49" charset="0"/>
-                        </a:rPr>
-                        <a:t>body</a:t>
-                      </a:r>
-                      <a:r>
-                        <a:rPr lang="en-US" sz="1200" b="0" dirty="0" smtClean="0">
-                          <a:solidFill>
-                            <a:schemeClr val="tx1"/>
-                          </a:solidFill>
-                          <a:latin typeface="Courier New" pitchFamily="49" charset="0"/>
-                        </a:rPr>
-                        <a:t> Task1 </a:t>
-                      </a:r>
-                      <a:r>
-                        <a:rPr lang="en-US" sz="1200" b="1" dirty="0" smtClean="0">
-                          <a:solidFill>
-                            <a:schemeClr val="tx1"/>
-                          </a:solidFill>
-                          <a:latin typeface="Courier New" pitchFamily="49" charset="0"/>
-                        </a:rPr>
-                        <a:t>is</a:t>
-                      </a:r>
-                    </a:p>
-                    <a:p>
-                      <a:r>
-                        <a:rPr lang="en-US" sz="1200" b="0" dirty="0" smtClean="0">
-                          <a:solidFill>
-                            <a:schemeClr val="tx1"/>
-                          </a:solidFill>
-                          <a:latin typeface="Courier New" pitchFamily="49" charset="0"/>
-                        </a:rPr>
-                        <a:t>      </a:t>
-                      </a:r>
-                      <a:r>
-                        <a:rPr lang="en-US" sz="1200" b="1" dirty="0" smtClean="0">
-                          <a:solidFill>
-                            <a:schemeClr val="tx1"/>
-                          </a:solidFill>
-                          <a:latin typeface="Courier New" pitchFamily="49" charset="0"/>
-                        </a:rPr>
-                        <a:t>begin</a:t>
-                      </a:r>
-                    </a:p>
-                    <a:p>
-                      <a:r>
-                        <a:rPr lang="en-US" sz="1200" b="0" dirty="0" smtClean="0">
-                          <a:solidFill>
-                            <a:schemeClr val="tx1"/>
-                          </a:solidFill>
-                          <a:latin typeface="Courier New" pitchFamily="49" charset="0"/>
-                        </a:rPr>
-                        <a:t>         </a:t>
-                      </a:r>
-                      <a:r>
-                        <a:rPr lang="en-US" sz="1200" b="1" dirty="0" smtClean="0">
-                          <a:solidFill>
-                            <a:schemeClr val="tx1"/>
-                          </a:solidFill>
-                          <a:latin typeface="Courier New" pitchFamily="49" charset="0"/>
-                        </a:rPr>
-                        <a:t>for</a:t>
-                      </a:r>
-                      <a:r>
-                        <a:rPr lang="en-US" sz="1200" b="0" dirty="0" smtClean="0">
-                          <a:solidFill>
-                            <a:schemeClr val="tx1"/>
-                          </a:solidFill>
-                          <a:latin typeface="Courier New" pitchFamily="49" charset="0"/>
-                        </a:rPr>
-                        <a:t> I </a:t>
-                      </a:r>
-                      <a:r>
-                        <a:rPr lang="en-US" sz="1200" b="1" dirty="0" smtClean="0">
-                          <a:solidFill>
-                            <a:schemeClr val="tx1"/>
-                          </a:solidFill>
-                          <a:latin typeface="Courier New" pitchFamily="49" charset="0"/>
-                        </a:rPr>
-                        <a:t>in</a:t>
-                      </a:r>
-                      <a:r>
-                        <a:rPr lang="en-US" sz="1200" b="0" dirty="0" smtClean="0">
-                          <a:solidFill>
-                            <a:schemeClr val="tx1"/>
-                          </a:solidFill>
-                          <a:latin typeface="Courier New" pitchFamily="49" charset="0"/>
-                        </a:rPr>
-                        <a:t> 1..100 </a:t>
-                      </a:r>
-                      <a:r>
-                        <a:rPr lang="en-US" sz="1200" b="1" dirty="0" smtClean="0">
-                          <a:solidFill>
-                            <a:schemeClr val="tx1"/>
-                          </a:solidFill>
-                          <a:latin typeface="Courier New" pitchFamily="49" charset="0"/>
-                        </a:rPr>
-                        <a:t>loop</a:t>
-                      </a:r>
-                    </a:p>
-                    <a:p>
-                      <a:r>
-                        <a:rPr lang="en-US" sz="1200" b="0" dirty="0" smtClean="0">
-                          <a:solidFill>
-                            <a:schemeClr val="tx1"/>
-                          </a:solidFill>
-                          <a:latin typeface="Courier New" pitchFamily="49" charset="0"/>
-                        </a:rPr>
-                        <a:t>            Variable := </a:t>
-                      </a:r>
-                      <a:r>
-                        <a:rPr lang="en-US" sz="1200" b="1" dirty="0" smtClean="0">
-                          <a:solidFill>
-                            <a:schemeClr val="tx1"/>
-                          </a:solidFill>
-                          <a:latin typeface="Courier New" pitchFamily="49" charset="0"/>
-                        </a:rPr>
-                        <a:t>not</a:t>
-                      </a:r>
-                      <a:r>
-                        <a:rPr lang="en-US" sz="1200" b="0" dirty="0" smtClean="0">
-                          <a:solidFill>
-                            <a:schemeClr val="tx1"/>
-                          </a:solidFill>
-                          <a:latin typeface="Courier New" pitchFamily="49" charset="0"/>
-                        </a:rPr>
-                        <a:t> Variable;</a:t>
-                      </a:r>
-                    </a:p>
-                    <a:p>
-                      <a:r>
-                        <a:rPr lang="en-US" sz="1200" b="0" baseline="0" dirty="0" smtClean="0">
-                          <a:solidFill>
-                            <a:schemeClr val="tx1"/>
-                          </a:solidFill>
-                          <a:latin typeface="Courier New" pitchFamily="49" charset="0"/>
-                        </a:rPr>
-                        <a:t>            </a:t>
-                      </a:r>
-                      <a:r>
-                        <a:rPr lang="en-US" sz="1200" b="0" dirty="0" err="1" smtClean="0">
-                          <a:solidFill>
-                            <a:schemeClr val="tx1"/>
-                          </a:solidFill>
-                          <a:latin typeface="Courier New" pitchFamily="49" charset="0"/>
-                        </a:rPr>
-                        <a:t>Put_Line</a:t>
-                      </a:r>
-                      <a:r>
-                        <a:rPr lang="en-US" sz="1200" b="0" dirty="0" smtClean="0">
-                          <a:solidFill>
-                            <a:schemeClr val="tx1"/>
-                          </a:solidFill>
-                          <a:latin typeface="Courier New" pitchFamily="49" charset="0"/>
-                        </a:rPr>
-                        <a:t>(</a:t>
-                      </a:r>
-                      <a:r>
-                        <a:rPr lang="en-US" sz="1200" b="0" dirty="0" err="1" smtClean="0">
-                          <a:solidFill>
-                            <a:schemeClr val="tx1"/>
-                          </a:solidFill>
-                          <a:latin typeface="Courier New" pitchFamily="49" charset="0"/>
-                        </a:rPr>
-                        <a:t>Variable'Img</a:t>
-                      </a:r>
-                      <a:r>
-                        <a:rPr lang="en-US" sz="1200" b="0" dirty="0" smtClean="0">
-                          <a:solidFill>
-                            <a:schemeClr val="tx1"/>
-                          </a:solidFill>
-                          <a:latin typeface="Courier New" pitchFamily="49" charset="0"/>
-                        </a:rPr>
-                        <a:t>);</a:t>
-                      </a:r>
-                    </a:p>
-                    <a:p>
-                      <a:r>
-                        <a:rPr lang="en-US" sz="1200" b="0" dirty="0" smtClean="0">
-                          <a:solidFill>
-                            <a:schemeClr val="tx1"/>
-                          </a:solidFill>
-                          <a:latin typeface="Courier New" pitchFamily="49" charset="0"/>
-                        </a:rPr>
-                        <a:t>            </a:t>
-                      </a:r>
-                      <a:r>
-                        <a:rPr lang="en-US" sz="1200" b="1" dirty="0" smtClean="0">
-                          <a:solidFill>
-                            <a:schemeClr val="tx1"/>
-                          </a:solidFill>
-                          <a:latin typeface="Courier New" pitchFamily="49" charset="0"/>
-                        </a:rPr>
-                        <a:t>delay</a:t>
-                      </a:r>
-                      <a:r>
-                        <a:rPr lang="en-US" sz="1200" b="0" dirty="0" smtClean="0">
-                          <a:solidFill>
-                            <a:schemeClr val="tx1"/>
-                          </a:solidFill>
-                          <a:latin typeface="Courier New" pitchFamily="49" charset="0"/>
-                        </a:rPr>
-                        <a:t> 0.2;</a:t>
-                      </a:r>
-                    </a:p>
-                    <a:p>
-                      <a:r>
-                        <a:rPr lang="en-US" sz="1200" b="0" dirty="0" smtClean="0">
-                          <a:solidFill>
-                            <a:schemeClr val="tx1"/>
-                          </a:solidFill>
-                          <a:latin typeface="Courier New" pitchFamily="49" charset="0"/>
-                        </a:rPr>
-                        <a:t>         end loop;</a:t>
-                      </a:r>
-                    </a:p>
-                    <a:p>
-                      <a:r>
-                        <a:rPr lang="en-US" sz="1200" b="0" dirty="0" smtClean="0">
-                          <a:solidFill>
-                            <a:schemeClr val="tx1"/>
-                          </a:solidFill>
-                          <a:latin typeface="Courier New" pitchFamily="49" charset="0"/>
-                        </a:rPr>
-                        <a:t>      end Task1;</a:t>
-                      </a:r>
-                    </a:p>
-                    <a:p>
-                      <a:r>
-                        <a:rPr lang="en-US" sz="1200" b="0" dirty="0" smtClean="0">
-                          <a:solidFill>
-                            <a:schemeClr val="tx1"/>
-                          </a:solidFill>
-                          <a:latin typeface="Courier New" pitchFamily="49" charset="0"/>
-                        </a:rPr>
-                        <a:t>      </a:t>
-                      </a:r>
-                    </a:p>
-                    <a:p>
-                      <a:r>
-                        <a:rPr lang="en-US" sz="1200" b="0" dirty="0" smtClean="0">
-                          <a:solidFill>
-                            <a:schemeClr val="tx1"/>
-                          </a:solidFill>
-                          <a:latin typeface="Courier New" pitchFamily="49" charset="0"/>
-                        </a:rPr>
-                        <a:t>      </a:t>
-                      </a:r>
-                      <a:r>
-                        <a:rPr lang="en-US" sz="1200" b="1" dirty="0" smtClean="0">
-                          <a:solidFill>
-                            <a:schemeClr val="tx1"/>
-                          </a:solidFill>
-                          <a:latin typeface="Courier New" pitchFamily="49" charset="0"/>
-                        </a:rPr>
-                        <a:t>task</a:t>
-                      </a:r>
-                      <a:r>
-                        <a:rPr lang="en-US" sz="1200" b="0" dirty="0" smtClean="0">
+                        <a:rPr lang="en-US" sz="1100" b="0" baseline="0" dirty="0" err="1" smtClean="0">
+                          <a:solidFill>
+                            <a:schemeClr val="tx1"/>
+                          </a:solidFill>
+                          <a:latin typeface="Courier New" pitchFamily="49" charset="0"/>
+                        </a:rPr>
+                        <a:t>Simple_Task</a:t>
+                      </a:r>
+                      <a:r>
+                        <a:rPr lang="en-US" sz="1100" b="0" baseline="0" dirty="0" smtClean="0">
+                          <a:solidFill>
+                            <a:schemeClr val="tx1"/>
+                          </a:solidFill>
+                          <a:latin typeface="Courier New" pitchFamily="49" charset="0"/>
+                        </a:rPr>
+                        <a:t>;</a:t>
+                      </a:r>
+                      <a:endParaRPr lang="en-US" sz="1100" b="0" dirty="0" smtClean="0">
+                        <a:solidFill>
+                          <a:schemeClr val="tx1"/>
+                        </a:solidFill>
+                        <a:latin typeface="Courier New" pitchFamily="49" charset="0"/>
+                      </a:endParaRPr>
+                    </a:p>
+                    <a:p>
+                      <a:endParaRPr lang="en-US" sz="1100" b="1" dirty="0" smtClean="0">
+                        <a:solidFill>
+                          <a:schemeClr val="tx1"/>
+                        </a:solidFill>
+                        <a:latin typeface="Courier New" pitchFamily="49" charset="0"/>
+                      </a:endParaRPr>
+                    </a:p>
+                    <a:p>
+                      <a:r>
+                        <a:rPr lang="en-US" sz="1100" b="1" dirty="0" smtClean="0">
+                          <a:solidFill>
+                            <a:schemeClr val="tx1"/>
+                          </a:solidFill>
+                          <a:latin typeface="Courier New" pitchFamily="49" charset="0"/>
+                        </a:rPr>
+                        <a:t>end</a:t>
+                      </a:r>
+                      <a:r>
+                        <a:rPr lang="en-US" sz="1100" b="0" baseline="0" dirty="0" smtClean="0">
                           <a:solidFill>
                             <a:schemeClr val="tx1"/>
                           </a:solidFill>
@@ -28313,313 +27922,25 @@
                         <a:t> </a:t>
                       </a:r>
                       <a:r>
-                        <a:rPr lang="en-US" sz="1200" b="1" dirty="0" smtClean="0">
-                          <a:solidFill>
-                            <a:schemeClr val="tx1"/>
-                          </a:solidFill>
-                          <a:latin typeface="Courier New" pitchFamily="49" charset="0"/>
-                        </a:rPr>
-                        <a:t>body</a:t>
-                      </a:r>
-                      <a:r>
-                        <a:rPr lang="en-US" sz="1200" b="0" dirty="0" smtClean="0">
-                          <a:solidFill>
-                            <a:schemeClr val="tx1"/>
-                          </a:solidFill>
-                          <a:latin typeface="Courier New" pitchFamily="49" charset="0"/>
-                        </a:rPr>
-                        <a:t> Task2 </a:t>
-                      </a:r>
-                      <a:r>
-                        <a:rPr lang="en-US" sz="1200" b="1" dirty="0" smtClean="0">
-                          <a:solidFill>
-                            <a:schemeClr val="tx1"/>
-                          </a:solidFill>
-                          <a:latin typeface="Courier New" pitchFamily="49" charset="0"/>
-                        </a:rPr>
-                        <a:t>is</a:t>
-                      </a:r>
-                    </a:p>
-                    <a:p>
-                      <a:r>
-                        <a:rPr lang="en-US" sz="1200" b="0" dirty="0" smtClean="0">
-                          <a:solidFill>
-                            <a:schemeClr val="tx1"/>
-                          </a:solidFill>
-                          <a:latin typeface="Courier New" pitchFamily="49" charset="0"/>
-                        </a:rPr>
-                        <a:t>      </a:t>
-                      </a:r>
-                      <a:r>
-                        <a:rPr lang="en-US" sz="1200" b="1" u="none" dirty="0" smtClean="0">
-                          <a:solidFill>
-                            <a:schemeClr val="tx1"/>
-                          </a:solidFill>
-                          <a:latin typeface="Courier New" pitchFamily="49" charset="0"/>
-                        </a:rPr>
-                        <a:t>begin</a:t>
-                      </a:r>
-                    </a:p>
-                    <a:p>
-                      <a:r>
-                        <a:rPr lang="en-US" sz="1200" b="0" dirty="0" smtClean="0">
-                          <a:solidFill>
-                            <a:schemeClr val="tx1"/>
-                          </a:solidFill>
-                          <a:latin typeface="Courier New" pitchFamily="49" charset="0"/>
-                        </a:rPr>
-                        <a:t>         </a:t>
-                      </a:r>
-                      <a:r>
-                        <a:rPr lang="en-US" sz="1200" b="1" dirty="0" smtClean="0">
-                          <a:solidFill>
-                            <a:schemeClr val="tx1"/>
-                          </a:solidFill>
-                          <a:latin typeface="Courier New" pitchFamily="49" charset="0"/>
-                        </a:rPr>
-                        <a:t>for</a:t>
-                      </a:r>
-                      <a:r>
-                        <a:rPr lang="en-US" sz="1200" b="0" dirty="0" smtClean="0">
-                          <a:solidFill>
-                            <a:schemeClr val="tx1"/>
-                          </a:solidFill>
-                          <a:latin typeface="Courier New" pitchFamily="49" charset="0"/>
-                        </a:rPr>
-                        <a:t> I </a:t>
-                      </a:r>
-                      <a:r>
-                        <a:rPr lang="en-US" sz="1200" b="1" dirty="0" smtClean="0">
-                          <a:solidFill>
-                            <a:schemeClr val="tx1"/>
-                          </a:solidFill>
-                          <a:latin typeface="Courier New" pitchFamily="49" charset="0"/>
-                        </a:rPr>
-                        <a:t>in</a:t>
-                      </a:r>
-                      <a:r>
-                        <a:rPr lang="en-US" sz="1200" b="0" dirty="0" smtClean="0">
-                          <a:solidFill>
-                            <a:schemeClr val="tx1"/>
-                          </a:solidFill>
-                          <a:latin typeface="Courier New" pitchFamily="49" charset="0"/>
-                        </a:rPr>
-                        <a:t> 1..100 </a:t>
-                      </a:r>
-                      <a:r>
-                        <a:rPr lang="en-US" sz="1200" b="1" dirty="0" smtClean="0">
-                          <a:solidFill>
-                            <a:schemeClr val="tx1"/>
-                          </a:solidFill>
-                          <a:latin typeface="Courier New" pitchFamily="49" charset="0"/>
-                        </a:rPr>
-                        <a:t>loop</a:t>
-                      </a:r>
-                    </a:p>
-                    <a:p>
-                      <a:r>
-                        <a:rPr lang="en-US" sz="1200" b="0" dirty="0" smtClean="0">
-                          <a:solidFill>
-                            <a:schemeClr val="tx1"/>
-                          </a:solidFill>
-                          <a:latin typeface="Courier New" pitchFamily="49" charset="0"/>
-                        </a:rPr>
-                        <a:t>            Variable := </a:t>
-                      </a:r>
-                      <a:r>
-                        <a:rPr lang="en-US" sz="1200" b="1" dirty="0" smtClean="0">
-                          <a:solidFill>
-                            <a:schemeClr val="tx1"/>
-                          </a:solidFill>
-                          <a:latin typeface="Courier New" pitchFamily="49" charset="0"/>
-                        </a:rPr>
-                        <a:t>not</a:t>
-                      </a:r>
-                      <a:r>
-                        <a:rPr lang="en-US" sz="1200" b="0" dirty="0" smtClean="0">
-                          <a:solidFill>
-                            <a:schemeClr val="tx1"/>
-                          </a:solidFill>
-                          <a:latin typeface="Courier New" pitchFamily="49" charset="0"/>
-                        </a:rPr>
-                        <a:t> Variable;</a:t>
-                      </a:r>
-                    </a:p>
-                    <a:p>
-                      <a:r>
-                        <a:rPr lang="en-US" sz="1200" b="0" baseline="0" dirty="0" smtClean="0">
-                          <a:solidFill>
-                            <a:schemeClr val="tx1"/>
-                          </a:solidFill>
-                          <a:latin typeface="Courier New" pitchFamily="49" charset="0"/>
-                        </a:rPr>
-                        <a:t>            </a:t>
-                      </a:r>
-                      <a:r>
-                        <a:rPr lang="en-US" sz="1200" b="0" dirty="0" err="1" smtClean="0">
-                          <a:solidFill>
-                            <a:schemeClr val="tx1"/>
-                          </a:solidFill>
-                          <a:latin typeface="Courier New" pitchFamily="49" charset="0"/>
-                        </a:rPr>
-                        <a:t>Put_Line</a:t>
-                      </a:r>
-                      <a:r>
-                        <a:rPr lang="en-US" sz="1200" b="0" dirty="0" smtClean="0">
-                          <a:solidFill>
-                            <a:schemeClr val="tx1"/>
-                          </a:solidFill>
-                          <a:latin typeface="Courier New" pitchFamily="49" charset="0"/>
-                        </a:rPr>
-                        <a:t>(</a:t>
-                      </a:r>
-                      <a:r>
-                        <a:rPr lang="en-US" sz="1200" b="0" dirty="0" err="1" smtClean="0">
-                          <a:solidFill>
-                            <a:schemeClr val="tx1"/>
-                          </a:solidFill>
-                          <a:latin typeface="Courier New" pitchFamily="49" charset="0"/>
-                        </a:rPr>
-                        <a:t>Variable'Img</a:t>
-                      </a:r>
-                      <a:r>
-                        <a:rPr lang="en-US" sz="1200" b="0" dirty="0" smtClean="0">
-                          <a:solidFill>
-                            <a:schemeClr val="tx1"/>
-                          </a:solidFill>
-                          <a:latin typeface="Courier New" pitchFamily="49" charset="0"/>
-                        </a:rPr>
-                        <a:t>);</a:t>
-                      </a:r>
-                    </a:p>
-                    <a:p>
-                      <a:r>
-                        <a:rPr lang="en-US" sz="1200" b="0" dirty="0" smtClean="0">
-                          <a:solidFill>
-                            <a:schemeClr val="tx1"/>
-                          </a:solidFill>
-                          <a:latin typeface="Courier New" pitchFamily="49" charset="0"/>
-                        </a:rPr>
-                        <a:t>            </a:t>
-                      </a:r>
-                      <a:r>
-                        <a:rPr lang="en-US" sz="1200" b="1" dirty="0" smtClean="0">
-                          <a:solidFill>
-                            <a:schemeClr val="tx1"/>
-                          </a:solidFill>
-                          <a:latin typeface="Courier New" pitchFamily="49" charset="0"/>
-                        </a:rPr>
-                        <a:t>delay</a:t>
-                      </a:r>
-                      <a:r>
-                        <a:rPr lang="en-US" sz="1200" b="0" dirty="0" smtClean="0">
-                          <a:solidFill>
-                            <a:schemeClr val="tx1"/>
-                          </a:solidFill>
-                          <a:latin typeface="Courier New" pitchFamily="49" charset="0"/>
-                        </a:rPr>
-                        <a:t> 0.2;</a:t>
-                      </a:r>
-                    </a:p>
-                    <a:p>
-                      <a:r>
-                        <a:rPr lang="en-US" sz="1200" b="0" dirty="0" smtClean="0">
-                          <a:solidFill>
-                            <a:schemeClr val="tx1"/>
-                          </a:solidFill>
-                          <a:latin typeface="Courier New" pitchFamily="49" charset="0"/>
-                        </a:rPr>
-                        <a:t>         </a:t>
-                      </a:r>
-                      <a:r>
-                        <a:rPr lang="en-US" sz="1200" b="1" dirty="0" smtClean="0">
-                          <a:solidFill>
-                            <a:schemeClr val="tx1"/>
-                          </a:solidFill>
-                          <a:latin typeface="Courier New" pitchFamily="49" charset="0"/>
-                        </a:rPr>
-                        <a:t>end</a:t>
-                      </a:r>
-                      <a:r>
-                        <a:rPr lang="en-US" sz="1200" b="0" dirty="0" smtClean="0">
-                          <a:solidFill>
-                            <a:schemeClr val="tx1"/>
-                          </a:solidFill>
-                          <a:latin typeface="Courier New" pitchFamily="49" charset="0"/>
-                        </a:rPr>
-                        <a:t> loop;</a:t>
-                      </a:r>
-                    </a:p>
-                    <a:p>
-                      <a:r>
-                        <a:rPr lang="en-US" sz="1200" b="0" dirty="0" smtClean="0">
-                          <a:solidFill>
-                            <a:schemeClr val="tx1"/>
-                          </a:solidFill>
-                          <a:latin typeface="Courier New" pitchFamily="49" charset="0"/>
-                        </a:rPr>
-                        <a:t>      </a:t>
-                      </a:r>
-                      <a:r>
-                        <a:rPr lang="en-US" sz="1200" b="1" dirty="0" smtClean="0">
-                          <a:solidFill>
-                            <a:schemeClr val="tx1"/>
-                          </a:solidFill>
-                          <a:latin typeface="Courier New" pitchFamily="49" charset="0"/>
-                        </a:rPr>
-                        <a:t>end</a:t>
-                      </a:r>
-                      <a:r>
-                        <a:rPr lang="en-US" sz="1200" b="0" dirty="0" smtClean="0">
-                          <a:solidFill>
-                            <a:schemeClr val="tx1"/>
-                          </a:solidFill>
-                          <a:latin typeface="Courier New" pitchFamily="49" charset="0"/>
-                        </a:rPr>
-                        <a:t> Task2;</a:t>
-                      </a:r>
-                    </a:p>
-                    <a:p>
-                      <a:r>
-                        <a:rPr lang="en-US" sz="1200" b="0" dirty="0" smtClean="0">
-                          <a:solidFill>
-                            <a:schemeClr val="tx1"/>
-                          </a:solidFill>
-                          <a:latin typeface="Courier New" pitchFamily="49" charset="0"/>
-                        </a:rPr>
-                        <a:t>   </a:t>
-                      </a:r>
-                      <a:r>
-                        <a:rPr lang="en-US" sz="1200" b="1" dirty="0" smtClean="0">
-                          <a:solidFill>
-                            <a:schemeClr val="tx1"/>
-                          </a:solidFill>
-                          <a:latin typeface="Courier New" pitchFamily="49" charset="0"/>
-                        </a:rPr>
-                        <a:t>begin</a:t>
-                      </a:r>
-                    </a:p>
-                    <a:p>
-                      <a:r>
-                        <a:rPr lang="en-US" sz="1200" b="0" dirty="0" smtClean="0">
-                          <a:solidFill>
-                            <a:schemeClr val="tx1"/>
-                          </a:solidFill>
-                          <a:latin typeface="Courier New" pitchFamily="49" charset="0"/>
-                        </a:rPr>
-                        <a:t>      </a:t>
-                      </a:r>
-                      <a:r>
-                        <a:rPr lang="en-US" sz="1200" b="1" dirty="0" smtClean="0">
-                          <a:solidFill>
-                            <a:schemeClr val="tx1"/>
-                          </a:solidFill>
-                          <a:latin typeface="Courier New" pitchFamily="49" charset="0"/>
-                        </a:rPr>
-                        <a:t>null</a:t>
-                      </a:r>
-                      <a:r>
-                        <a:rPr lang="en-US" sz="1200" b="0" dirty="0" smtClean="0">
+                        <a:rPr lang="en-US" sz="1100" b="0" dirty="0" err="1" smtClean="0">
+                          <a:solidFill>
+                            <a:schemeClr val="tx1"/>
+                          </a:solidFill>
+                          <a:latin typeface="Courier New" pitchFamily="49" charset="0"/>
+                        </a:rPr>
+                        <a:t>Simple_Tasking_Program</a:t>
+                      </a:r>
+                      <a:r>
+                        <a:rPr lang="en-US" sz="1100" b="0" dirty="0" smtClean="0">
+                          <a:solidFill>
+                            <a:schemeClr val="tx1"/>
+                          </a:solidFill>
+                          <a:latin typeface="Courier New" pitchFamily="49" charset="0"/>
+                        </a:rPr>
+                        <a:t> </a:t>
+                      </a:r>
+                      <a:r>
+                        <a:rPr lang="en-US" sz="1100" b="0" baseline="0" dirty="0" smtClean="0">
                           <a:solidFill>
                             <a:schemeClr val="tx1"/>
                           </a:solidFill>
@@ -28627,74 +27948,7 @@
                         </a:rPr>
                         <a:t>;</a:t>
                       </a:r>
-                    </a:p>
-                    <a:p>
-                      <a:r>
-                        <a:rPr lang="en-US" sz="1200" b="0" dirty="0" smtClean="0">
-                          <a:solidFill>
-                            <a:schemeClr val="tx1"/>
-                          </a:solidFill>
-                          <a:latin typeface="Courier New" pitchFamily="49" charset="0"/>
-                        </a:rPr>
-                        <a:t>   </a:t>
-                      </a:r>
-                      <a:r>
-                        <a:rPr lang="en-US" sz="1200" b="1" dirty="0" smtClean="0">
-                          <a:solidFill>
-                            <a:schemeClr val="tx1"/>
-                          </a:solidFill>
-                          <a:latin typeface="Courier New" pitchFamily="49" charset="0"/>
-                        </a:rPr>
-                        <a:t>end</a:t>
-                      </a:r>
-                      <a:r>
-                        <a:rPr lang="en-US" sz="1200" b="0" dirty="0" smtClean="0">
-                          <a:solidFill>
-                            <a:schemeClr val="tx1"/>
-                          </a:solidFill>
-                          <a:latin typeface="Courier New" pitchFamily="49" charset="0"/>
-                        </a:rPr>
-                        <a:t> </a:t>
-                      </a:r>
-                      <a:r>
-                        <a:rPr lang="en-US" sz="1200" b="0" dirty="0" err="1" smtClean="0">
-                          <a:solidFill>
-                            <a:schemeClr val="tx1"/>
-                          </a:solidFill>
-                          <a:latin typeface="Courier New" pitchFamily="49" charset="0"/>
-                        </a:rPr>
-                        <a:t>Two_Tasks</a:t>
-                      </a:r>
-                      <a:r>
-                        <a:rPr lang="en-US" sz="1200" b="0" dirty="0" smtClean="0">
-                          <a:solidFill>
-                            <a:schemeClr val="tx1"/>
-                          </a:solidFill>
-                          <a:latin typeface="Courier New" pitchFamily="49" charset="0"/>
-                        </a:rPr>
-                        <a:t>;</a:t>
-                      </a:r>
-                    </a:p>
-                    <a:p>
-                      <a:r>
-                        <a:rPr lang="en-US" sz="1200" b="1" dirty="0" smtClean="0">
-                          <a:solidFill>
-                            <a:schemeClr val="tx1"/>
-                          </a:solidFill>
-                          <a:latin typeface="Courier New" pitchFamily="49" charset="0"/>
-                        </a:rPr>
-                        <a:t>end</a:t>
-                      </a:r>
-                      <a:r>
-                        <a:rPr lang="en-US" sz="1200" b="0" dirty="0" smtClean="0">
-                          <a:solidFill>
-                            <a:schemeClr val="tx1"/>
-                          </a:solidFill>
-                          <a:latin typeface="Courier New" pitchFamily="49" charset="0"/>
-                        </a:rPr>
-                        <a:t> Main;</a:t>
-                      </a:r>
-                      <a:endParaRPr lang="en-US" sz="1200" b="0" i="1" dirty="0" smtClean="0">
+                      <a:endParaRPr lang="en-US" sz="1100" b="0" i="1" dirty="0" smtClean="0">
                         <a:solidFill>
                           <a:schemeClr val="tx1"/>
                         </a:solidFill>
@@ -28715,73 +27969,19 @@
           </a:graphicData>
         </a:graphic>
       </p:graphicFrame>
-      <p:pic>
-        <p:nvPicPr>
-          <p:cNvPr id="5" name="Picture 8" descr="wrong.png"/>
-          <p:cNvPicPr>
-            <a:picLocks noChangeAspect="1"/>
-          </p:cNvPicPr>
-          <p:nvPr/>
-        </p:nvPicPr>
-        <p:blipFill>
-          <a:blip r:embed="rId2" cstate="print">
-            <a:extLst>
-              <a:ext uri="{28A0092B-C50C-407E-A947-70E740481C1C}">
-                <a14:useLocalDpi xmlns:a14="http://schemas.microsoft.com/office/drawing/2010/main" val="0"/>
-              </a:ext>
-            </a:extLst>
-          </a:blip>
-          <a:srcRect/>
-          <a:stretch>
-            <a:fillRect/>
-          </a:stretch>
-        </p:blipFill>
-        <p:spPr bwMode="auto">
-          <a:xfrm>
-            <a:off x="1723867" y="3191488"/>
-            <a:ext cx="239712" cy="238125"/>
-          </a:xfrm>
-          <a:prstGeom prst="rect">
-            <a:avLst/>
-          </a:prstGeom>
-          <a:noFill/>
-          <a:ln>
-            <a:noFill/>
-          </a:ln>
-          <a:extLst>
-            <a:ext uri="{909E8E84-426E-40DD-AFC4-6F175D3DCCD1}">
-              <a14:hiddenFill xmlns:a14="http://schemas.microsoft.com/office/drawing/2010/main">
-                <a:solidFill>
-                  <a:srgbClr val="FFFFFF"/>
-                </a:solidFill>
-              </a14:hiddenFill>
-            </a:ext>
-            <a:ext uri="{91240B29-F687-4F45-9708-019B960494DF}">
-              <a14:hiddenLine xmlns:a14="http://schemas.microsoft.com/office/drawing/2010/main" w="9525">
-                <a:solidFill>
-                  <a:srgbClr val="000000"/>
-                </a:solidFill>
-                <a:miter lim="800000"/>
-                <a:headEnd/>
-                <a:tailEnd/>
-              </a14:hiddenLine>
-            </a:ext>
-          </a:extLst>
-        </p:spPr>
-      </p:pic>
       <p:cxnSp>
         <p:nvCxnSpPr>
-          <p:cNvPr id="6" name="Straight Connector 3"/>
+          <p:cNvPr id="7" name="Straight Connector 3"/>
           <p:cNvCxnSpPr>
             <a:cxnSpLocks noChangeShapeType="1"/>
-            <a:stCxn id="18" idx="2"/>
+            <a:stCxn id="13" idx="0"/>
           </p:cNvCxnSpPr>
           <p:nvPr/>
         </p:nvCxnSpPr>
         <p:spPr bwMode="auto">
-          <a:xfrm flipH="1">
-            <a:off x="3454431" y="1394565"/>
-            <a:ext cx="4002085" cy="1713793"/>
+          <a:xfrm flipH="1" flipV="1">
+            <a:off x="2605321" y="2950671"/>
+            <a:ext cx="3536202" cy="1999843"/>
           </a:xfrm>
           <a:prstGeom prst="line">
             <a:avLst/>
@@ -28806,7 +28006,7 @@
       </p:cxnSp>
       <p:sp>
         <p:nvSpPr>
-          <p:cNvPr id="7" name="Oval 2"/>
+          <p:cNvPr id="8" name="Oval 2"/>
           <p:cNvSpPr>
             <a:spLocks noChangeArrowheads="1"/>
           </p:cNvSpPr>
@@ -28814,8 +28014,8 @@
         </p:nvSpPr>
         <p:spPr bwMode="auto">
           <a:xfrm>
-            <a:off x="2021768" y="3108358"/>
-            <a:ext cx="2865324" cy="424551"/>
+            <a:off x="1729773" y="2664375"/>
+            <a:ext cx="1751094" cy="286296"/>
           </a:xfrm>
           <a:prstGeom prst="ellipse">
             <a:avLst/>
@@ -29013,7 +28213,7 @@
       </p:sp>
       <p:pic>
         <p:nvPicPr>
-          <p:cNvPr id="13" name="Picture 8" descr="wrong.png"/>
+          <p:cNvPr id="10" name="Picture 8" descr="wrong.png"/>
           <p:cNvPicPr>
             <a:picLocks noChangeAspect="1"/>
           </p:cNvPicPr>
@@ -29034,7 +28234,7 @@
         </p:blipFill>
         <p:spPr bwMode="auto">
           <a:xfrm>
-            <a:off x="1718320" y="4848488"/>
+            <a:off x="1408822" y="2688460"/>
             <a:ext cx="239712" cy="238125"/>
           </a:xfrm>
           <a:prstGeom prst="rect">
@@ -29065,266 +28265,23 @@
           </a:extLst>
         </p:spPr>
       </p:pic>
-      <p:sp>
-        <p:nvSpPr>
-          <p:cNvPr id="14" name="Oval 2"/>
-          <p:cNvSpPr>
-            <a:spLocks noChangeArrowheads="1"/>
-          </p:cNvSpPr>
-          <p:nvPr/>
-        </p:nvSpPr>
-        <p:spPr bwMode="auto">
-          <a:xfrm>
-            <a:off x="2016221" y="4757045"/>
-            <a:ext cx="2865324" cy="413471"/>
-          </a:xfrm>
-          <a:prstGeom prst="ellipse">
-            <a:avLst/>
-          </a:prstGeom>
-          <a:noFill/>
-          <a:ln w="25400">
-            <a:solidFill>
-              <a:srgbClr val="FF0000"/>
-            </a:solidFill>
-            <a:round/>
-            <a:headEnd/>
-            <a:tailEnd/>
-          </a:ln>
-          <a:extLst>
-            <a:ext uri="{909E8E84-426E-40DD-AFC4-6F175D3DCCD1}">
-              <a14:hiddenFill xmlns:a14="http://schemas.microsoft.com/office/drawing/2010/main">
-                <a:solidFill>
-                  <a:srgbClr val="FFFFFF"/>
-                </a:solidFill>
-              </a14:hiddenFill>
-            </a:ext>
-          </a:extLst>
-        </p:spPr>
-        <p:txBody>
-          <a:bodyPr/>
-          <a:lstStyle>
-            <a:lvl1pPr>
-              <a:lnSpc>
-                <a:spcPct val="120000"/>
-              </a:lnSpc>
-              <a:spcBef>
-                <a:spcPct val="20000"/>
-              </a:spcBef>
-              <a:buClr>
-                <a:srgbClr val="404040"/>
-              </a:buClr>
-              <a:buChar char="•"/>
-              <a:defRPr sz="1600" b="1">
-                <a:solidFill>
-                  <a:srgbClr val="404040"/>
-                </a:solidFill>
-                <a:latin typeface="Calibri" panose="020F0502020204030204" pitchFamily="34" charset="0"/>
-                <a:ea typeface="ＭＳ Ｐゴシック" panose="020B0600070205080204" pitchFamily="34" charset="-128"/>
-              </a:defRPr>
-            </a:lvl1pPr>
-            <a:lvl2pPr marL="37931725" indent="-37474525">
-              <a:lnSpc>
-                <a:spcPct val="120000"/>
-              </a:lnSpc>
-              <a:spcBef>
-                <a:spcPct val="20000"/>
-              </a:spcBef>
-              <a:buChar char="–"/>
-              <a:defRPr sz="1400">
-                <a:solidFill>
-                  <a:schemeClr val="tx1"/>
-                </a:solidFill>
-                <a:latin typeface="Calibri" panose="020F0502020204030204" pitchFamily="34" charset="0"/>
-                <a:ea typeface="ヒラギノ角ゴ ProN W3" pitchFamily="-84" charset="-128"/>
-              </a:defRPr>
-            </a:lvl2pPr>
-            <a:lvl3pPr marL="1143000" indent="-228600">
-              <a:lnSpc>
-                <a:spcPct val="120000"/>
-              </a:lnSpc>
-              <a:spcBef>
-                <a:spcPct val="20000"/>
-              </a:spcBef>
-              <a:buChar char="–"/>
-              <a:defRPr sz="1200">
-                <a:solidFill>
-                  <a:schemeClr val="tx1"/>
-                </a:solidFill>
-                <a:latin typeface="Calibri" panose="020F0502020204030204" pitchFamily="34" charset="0"/>
-                <a:ea typeface="ヒラギノ角ゴ ProN W3" pitchFamily="-84" charset="-128"/>
-              </a:defRPr>
-            </a:lvl3pPr>
-            <a:lvl4pPr marL="1600200" indent="-228600">
-              <a:spcBef>
-                <a:spcPct val="20000"/>
-              </a:spcBef>
-              <a:buFont typeface="Times" panose="02020603050405020304" pitchFamily="18" charset="0"/>
-              <a:buChar char="•"/>
-              <a:defRPr sz="1200">
-                <a:solidFill>
-                  <a:schemeClr val="tx1"/>
-                </a:solidFill>
-                <a:latin typeface="Calibri" panose="020F0502020204030204" pitchFamily="34" charset="0"/>
-                <a:ea typeface="ヒラギノ角ゴ ProN W3" pitchFamily="-84" charset="-128"/>
-              </a:defRPr>
-            </a:lvl4pPr>
-            <a:lvl5pPr marL="2057400" indent="-228600">
-              <a:spcBef>
-                <a:spcPct val="20000"/>
-              </a:spcBef>
-              <a:buFont typeface="Times" panose="02020603050405020304" pitchFamily="18" charset="0"/>
-              <a:buChar char="•"/>
-              <a:defRPr sz="1200">
-                <a:solidFill>
-                  <a:schemeClr val="tx1"/>
-                </a:solidFill>
-                <a:latin typeface="Calibri" panose="020F0502020204030204" pitchFamily="34" charset="0"/>
-                <a:ea typeface="ヒラギノ角ゴ ProN W3" pitchFamily="-84" charset="-128"/>
-              </a:defRPr>
-            </a:lvl5pPr>
-            <a:lvl6pPr marL="2514600" indent="-228600" eaLnBrk="0" fontAlgn="base" hangingPunct="0">
-              <a:spcBef>
-                <a:spcPct val="20000"/>
-              </a:spcBef>
-              <a:spcAft>
-                <a:spcPct val="0"/>
-              </a:spcAft>
-              <a:buFont typeface="Times" panose="02020603050405020304" pitchFamily="18" charset="0"/>
-              <a:buChar char="•"/>
-              <a:defRPr sz="1200">
-                <a:solidFill>
-                  <a:schemeClr val="tx1"/>
-                </a:solidFill>
-                <a:latin typeface="Calibri" panose="020F0502020204030204" pitchFamily="34" charset="0"/>
-                <a:ea typeface="ヒラギノ角ゴ ProN W3" pitchFamily="-84" charset="-128"/>
-              </a:defRPr>
-            </a:lvl6pPr>
-            <a:lvl7pPr marL="2971800" indent="-228600" eaLnBrk="0" fontAlgn="base" hangingPunct="0">
-              <a:spcBef>
-                <a:spcPct val="20000"/>
-              </a:spcBef>
-              <a:spcAft>
-                <a:spcPct val="0"/>
-              </a:spcAft>
-              <a:buFont typeface="Times" panose="02020603050405020304" pitchFamily="18" charset="0"/>
-              <a:buChar char="•"/>
-              <a:defRPr sz="1200">
-                <a:solidFill>
-                  <a:schemeClr val="tx1"/>
-                </a:solidFill>
-                <a:latin typeface="Calibri" panose="020F0502020204030204" pitchFamily="34" charset="0"/>
-                <a:ea typeface="ヒラギノ角ゴ ProN W3" pitchFamily="-84" charset="-128"/>
-              </a:defRPr>
-            </a:lvl7pPr>
-            <a:lvl8pPr marL="3429000" indent="-228600" eaLnBrk="0" fontAlgn="base" hangingPunct="0">
-              <a:spcBef>
-                <a:spcPct val="20000"/>
-              </a:spcBef>
-              <a:spcAft>
-                <a:spcPct val="0"/>
-              </a:spcAft>
-              <a:buFont typeface="Times" panose="02020603050405020304" pitchFamily="18" charset="0"/>
-              <a:buChar char="•"/>
-              <a:defRPr sz="1200">
-                <a:solidFill>
-                  <a:schemeClr val="tx1"/>
-                </a:solidFill>
-                <a:latin typeface="Calibri" panose="020F0502020204030204" pitchFamily="34" charset="0"/>
-                <a:ea typeface="ヒラギノ角ゴ ProN W3" pitchFamily="-84" charset="-128"/>
-              </a:defRPr>
-            </a:lvl8pPr>
-            <a:lvl9pPr marL="3886200" indent="-228600" eaLnBrk="0" fontAlgn="base" hangingPunct="0">
-              <a:spcBef>
-                <a:spcPct val="20000"/>
-              </a:spcBef>
-              <a:spcAft>
-                <a:spcPct val="0"/>
-              </a:spcAft>
-              <a:buFont typeface="Times" panose="02020603050405020304" pitchFamily="18" charset="0"/>
-              <a:buChar char="•"/>
-              <a:defRPr sz="1200">
-                <a:solidFill>
-                  <a:schemeClr val="tx1"/>
-                </a:solidFill>
-                <a:latin typeface="Calibri" panose="020F0502020204030204" pitchFamily="34" charset="0"/>
-                <a:ea typeface="ヒラギノ角ゴ ProN W3" pitchFamily="-84" charset="-128"/>
-              </a:defRPr>
-            </a:lvl9pPr>
-          </a:lstStyle>
-          <a:p>
-            <a:pPr eaLnBrk="1" hangingPunct="1">
-              <a:lnSpc>
-                <a:spcPct val="100000"/>
-              </a:lnSpc>
-              <a:spcBef>
-                <a:spcPct val="0"/>
-              </a:spcBef>
-              <a:buClrTx/>
-              <a:buFontTx/>
-              <a:buNone/>
-            </a:pPr>
-            <a:endParaRPr lang="en-US" altLang="en-US" sz="1800" b="0" i="1">
-              <a:solidFill>
-                <a:srgbClr val="000000"/>
-              </a:solidFill>
-              <a:latin typeface="Arial" panose="020B0604020202020204" pitchFamily="34" charset="0"/>
-            </a:endParaRPr>
-          </a:p>
-        </p:txBody>
-      </p:sp>
-      <p:cxnSp>
-        <p:nvCxnSpPr>
-          <p:cNvPr id="15" name="Straight Connector 3"/>
-          <p:cNvCxnSpPr>
-            <a:cxnSpLocks noChangeShapeType="1"/>
-            <a:stCxn id="18" idx="2"/>
-            <a:endCxn id="14" idx="0"/>
-          </p:cNvCxnSpPr>
-          <p:nvPr/>
-        </p:nvCxnSpPr>
-        <p:spPr bwMode="auto">
-          <a:xfrm flipH="1">
-            <a:off x="3448883" y="1394565"/>
-            <a:ext cx="4007633" cy="3362480"/>
-          </a:xfrm>
-          <a:prstGeom prst="line">
-            <a:avLst/>
-          </a:prstGeom>
-          <a:noFill/>
-          <a:ln w="25400">
-            <a:solidFill>
-              <a:srgbClr val="FF0000"/>
-            </a:solidFill>
-            <a:round/>
-            <a:headEnd/>
-            <a:tailEnd/>
-          </a:ln>
-          <a:extLst>
-            <a:ext uri="{909E8E84-426E-40DD-AFC4-6F175D3DCCD1}">
-              <a14:hiddenFill xmlns:a14="http://schemas.microsoft.com/office/drawing/2010/main">
-                <a:noFill/>
-              </a14:hiddenFill>
-            </a:ext>
-          </a:extLst>
-        </p:spPr>
-      </p:cxnSp>
       <p:graphicFrame>
         <p:nvGraphicFramePr>
-          <p:cNvPr id="18" name="Tableau 5"/>
+          <p:cNvPr id="13" name="Tableau 5"/>
           <p:cNvGraphicFramePr>
             <a:graphicFrameLocks noGrp="1"/>
           </p:cNvGraphicFramePr>
           <p:nvPr>
             <p:extLst>
               <p:ext uri="{D42A27DB-BD31-4B8C-83A1-F6EECF244321}">
-                <p14:modId xmlns:p14="http://schemas.microsoft.com/office/powerpoint/2010/main" val="1279122147"/>
+                <p14:modId xmlns:p14="http://schemas.microsoft.com/office/powerpoint/2010/main" val="662013285"/>
               </p:ext>
             </p:extLst>
           </p:nvPr>
         </p:nvGraphicFramePr>
         <p:xfrm>
-          <a:off x="5947031" y="707449"/>
-          <a:ext cx="3018970" cy="687116"/>
+          <a:off x="4283968" y="4950514"/>
+          <a:ext cx="3715111" cy="1432286"/>
         </p:xfrm>
         <a:graphic>
           <a:graphicData uri="http://schemas.openxmlformats.org/drawingml/2006/table">
@@ -29333,24 +28290,197 @@
                 <a:tableStyleId>{5C22544A-7EE6-4342-B048-85BDC9FD1C3A}</a:tableStyleId>
               </a:tblPr>
               <a:tblGrid>
-                <a:gridCol w="3018970"/>
+                <a:gridCol w="3715111"/>
               </a:tblGrid>
-              <a:tr h="687116">
+              <a:tr h="1181345">
                 <a:tc>
                   <a:txBody>
                     <a:bodyPr/>
                     <a:lstStyle/>
                     <a:p>
                       <a:r>
-                        <a:rPr lang="en-US" sz="1200" b="1" i="0" dirty="0" smtClean="0">
-                          <a:solidFill>
-                            <a:schemeClr val="tx1"/>
-                          </a:solidFill>
-                          <a:latin typeface="Courier New" pitchFamily="49" charset="0"/>
-                        </a:rPr>
-                        <a:t>Access to Variable should be protected to ensure thread safety</a:t>
-                      </a:r>
-                      <a:endParaRPr lang="en-US" sz="1200" b="0" i="0" dirty="0" smtClean="0">
+                        <a:rPr lang="en-US" sz="1100" b="1" dirty="0" smtClean="0">
+                          <a:solidFill>
+                            <a:schemeClr val="tx1"/>
+                          </a:solidFill>
+                          <a:latin typeface="Courier New" pitchFamily="49" charset="0"/>
+                        </a:rPr>
+                        <a:t>task</a:t>
+                      </a:r>
+                      <a:r>
+                        <a:rPr lang="en-US" sz="1100" b="1" baseline="0" dirty="0" smtClean="0">
+                          <a:solidFill>
+                            <a:schemeClr val="tx1"/>
+                          </a:solidFill>
+                          <a:latin typeface="Courier New" pitchFamily="49" charset="0"/>
+                        </a:rPr>
+                        <a:t> </a:t>
+                      </a:r>
+                      <a:r>
+                        <a:rPr lang="en-US" sz="1100" b="1" baseline="0" dirty="0" smtClean="0">
+                          <a:solidFill>
+                            <a:schemeClr val="tx1"/>
+                          </a:solidFill>
+                          <a:latin typeface="Courier New" pitchFamily="49" charset="0"/>
+                        </a:rPr>
+                        <a:t>body</a:t>
+                      </a:r>
+                      <a:r>
+                        <a:rPr lang="en-US" sz="1100" b="0" baseline="0" dirty="0" smtClean="0">
+                          <a:solidFill>
+                            <a:schemeClr val="tx1"/>
+                          </a:solidFill>
+                          <a:latin typeface="Courier New" pitchFamily="49" charset="0"/>
+                        </a:rPr>
+                        <a:t> </a:t>
+                      </a:r>
+                      <a:r>
+                        <a:rPr lang="en-US" sz="1100" b="0" baseline="0" dirty="0" err="1" smtClean="0">
+                          <a:solidFill>
+                            <a:schemeClr val="tx1"/>
+                          </a:solidFill>
+                          <a:latin typeface="Courier New" pitchFamily="49" charset="0"/>
+                        </a:rPr>
+                        <a:t>Simple_Task</a:t>
+                      </a:r>
+                      <a:r>
+                        <a:rPr lang="en-US" sz="1100" b="0" baseline="0" dirty="0" smtClean="0">
+                          <a:solidFill>
+                            <a:schemeClr val="tx1"/>
+                          </a:solidFill>
+                          <a:latin typeface="Courier New" pitchFamily="49" charset="0"/>
+                        </a:rPr>
+                        <a:t> </a:t>
+                      </a:r>
+                      <a:r>
+                        <a:rPr lang="en-US" sz="1100" b="1" baseline="0" dirty="0" smtClean="0">
+                          <a:solidFill>
+                            <a:schemeClr val="tx1"/>
+                          </a:solidFill>
+                          <a:latin typeface="Courier New" pitchFamily="49" charset="0"/>
+                        </a:rPr>
+                        <a:t>is</a:t>
+                      </a:r>
+                    </a:p>
+                    <a:p>
+                      <a:r>
+                        <a:rPr lang="en-US" sz="1100" b="1" baseline="0" dirty="0" smtClean="0">
+                          <a:solidFill>
+                            <a:schemeClr val="tx1"/>
+                          </a:solidFill>
+                          <a:latin typeface="Courier New" pitchFamily="49" charset="0"/>
+                        </a:rPr>
+                        <a:t>begin</a:t>
+                      </a:r>
+                      <a:endParaRPr lang="en-US" sz="1100" b="1" baseline="0" dirty="0" smtClean="0">
+                        <a:solidFill>
+                          <a:schemeClr val="tx1"/>
+                        </a:solidFill>
+                        <a:latin typeface="Courier New" pitchFamily="49" charset="0"/>
+                      </a:endParaRPr>
+                    </a:p>
+                    <a:p>
+                      <a:r>
+                        <a:rPr lang="en-US" sz="1100" b="0" baseline="0" dirty="0" smtClean="0">
+                          <a:solidFill>
+                            <a:schemeClr val="tx1"/>
+                          </a:solidFill>
+                          <a:latin typeface="Courier New" pitchFamily="49" charset="0"/>
+                        </a:rPr>
+                        <a:t>[…]</a:t>
+                      </a:r>
+                      <a:endParaRPr lang="en-US" sz="1100" b="1" dirty="0" smtClean="0">
+                        <a:solidFill>
+                          <a:schemeClr val="tx1"/>
+                        </a:solidFill>
+                        <a:latin typeface="Courier New" pitchFamily="49" charset="0"/>
+                      </a:endParaRPr>
+                    </a:p>
+                    <a:p>
+                      <a:r>
+                        <a:rPr lang="en-US" sz="1100" b="1" dirty="0" smtClean="0">
+                          <a:solidFill>
+                            <a:schemeClr val="tx1"/>
+                          </a:solidFill>
+                          <a:latin typeface="Courier New" pitchFamily="49" charset="0"/>
+                        </a:rPr>
+                        <a:t>end</a:t>
+                      </a:r>
+                      <a:r>
+                        <a:rPr lang="en-US" sz="1100" b="0" baseline="0" dirty="0" smtClean="0">
+                          <a:solidFill>
+                            <a:schemeClr val="tx1"/>
+                          </a:solidFill>
+                          <a:latin typeface="Courier New" pitchFamily="49" charset="0"/>
+                        </a:rPr>
+                        <a:t> </a:t>
+                      </a:r>
+                      <a:r>
+                        <a:rPr lang="en-US" sz="1100" b="0" dirty="0" err="1" smtClean="0">
+                          <a:solidFill>
+                            <a:schemeClr val="tx1"/>
+                          </a:solidFill>
+                          <a:latin typeface="Courier New" pitchFamily="49" charset="0"/>
+                        </a:rPr>
+                        <a:t>Simple_Tasking_Program</a:t>
+                      </a:r>
+                      <a:r>
+                        <a:rPr lang="en-US" sz="1100" b="0" dirty="0" smtClean="0">
+                          <a:solidFill>
+                            <a:schemeClr val="tx1"/>
+                          </a:solidFill>
+                          <a:latin typeface="Courier New" pitchFamily="49" charset="0"/>
+                        </a:rPr>
+                        <a:t> </a:t>
+                      </a:r>
+                      <a:r>
+                        <a:rPr lang="en-US" sz="1100" b="0" baseline="0" dirty="0" smtClean="0">
+                          <a:solidFill>
+                            <a:schemeClr val="tx1"/>
+                          </a:solidFill>
+                          <a:latin typeface="Courier New" pitchFamily="49" charset="0"/>
+                        </a:rPr>
+                        <a:t>;</a:t>
+                      </a:r>
+                    </a:p>
+                    <a:p>
+                      <a:endParaRPr lang="en-US" sz="1100" b="0" i="1" baseline="0" dirty="0" smtClean="0">
+                        <a:solidFill>
+                          <a:schemeClr val="tx1"/>
+                        </a:solidFill>
+                        <a:latin typeface="Courier New" pitchFamily="49" charset="0"/>
+                      </a:endParaRPr>
+                    </a:p>
+                    <a:p>
+                      <a:r>
+                        <a:rPr lang="en-US" sz="1100" b="0" i="1" baseline="0" dirty="0" smtClean="0">
+                          <a:solidFill>
+                            <a:schemeClr val="tx1"/>
+                          </a:solidFill>
+                          <a:latin typeface="Courier New" pitchFamily="49" charset="0"/>
+                        </a:rPr>
+                        <a:t>-- Must appear in declarative section</a:t>
+                      </a:r>
+                    </a:p>
+                    <a:p>
+                      <a:endParaRPr lang="en-US" sz="1100" b="0" i="1" baseline="0" dirty="0" smtClean="0">
+                        <a:solidFill>
+                          <a:schemeClr val="tx1"/>
+                        </a:solidFill>
+                        <a:latin typeface="Courier New" pitchFamily="49" charset="0"/>
+                      </a:endParaRPr>
+                    </a:p>
+                    <a:p>
+                      <a:r>
+                        <a:rPr lang="en-US" sz="1100" b="1" i="1" baseline="0" dirty="0" smtClean="0">
+                          <a:solidFill>
+                            <a:schemeClr val="tx1"/>
+                          </a:solidFill>
+                          <a:latin typeface="Courier New" pitchFamily="49" charset="0"/>
+                        </a:rPr>
+                        <a:t>begin</a:t>
+                      </a:r>
+                      <a:endParaRPr lang="en-US" sz="1100" b="1" i="1" dirty="0" smtClean="0">
                         <a:solidFill>
                           <a:schemeClr val="tx1"/>
                         </a:solidFill>
@@ -29374,7 +28504,7 @@
     </p:spTree>
     <p:extLst>
       <p:ext uri="{BB962C8B-B14F-4D97-AF65-F5344CB8AC3E}">
-        <p14:creationId xmlns:p14="http://schemas.microsoft.com/office/powerpoint/2010/main" val="466021148"/>
+        <p14:creationId xmlns:p14="http://schemas.microsoft.com/office/powerpoint/2010/main" val="1217668577"/>
       </p:ext>
     </p:extLst>
   </p:cSld>

</xml_diff>